<commit_message>
Simplify slides a bit further
</commit_message>
<xml_diff>
--- a/nyu_wireless.pptx
+++ b/nyu_wireless.pptx
@@ -6359,7 +6359,16 @@
           <a:p>
             <a:r>
               <a:rPr lang="en-US" dirty="0"/>
-              <a:t>My research so far: Designing fast and programmable routers</a:t>
+              <a:t>Motivation for fast and programmable networks</a:t>
+            </a:r>
+          </a:p>
+          <a:p>
+            <a:endParaRPr lang="en-US" dirty="0"/>
+          </a:p>
+          <a:p>
+            <a:r>
+              <a:rPr lang="en-US" dirty="0"/>
+              <a:t>Previous work: Designing fast and programmable routers</a:t>
             </a:r>
           </a:p>
           <a:p>
@@ -6527,6 +6536,55 @@
                                           <p:spTgt spid="3">
                                             <p:txEl>
                                               <p:pRg st="4" end="4"/>
+                                            </p:txEl>
+                                          </p:spTgt>
+                                        </p:tgtEl>
+                                        <p:attrNameLst>
+                                          <p:attrName>style.visibility</p:attrName>
+                                        </p:attrNameLst>
+                                      </p:cBhvr>
+                                      <p:to>
+                                        <p:strVal val="visible"/>
+                                      </p:to>
+                                    </p:set>
+                                  </p:childTnLst>
+                                </p:cTn>
+                              </p:par>
+                            </p:childTnLst>
+                          </p:cTn>
+                        </p:par>
+                      </p:childTnLst>
+                    </p:cTn>
+                  </p:par>
+                  <p:par>
+                    <p:cTn id="15" fill="hold">
+                      <p:stCondLst>
+                        <p:cond delay="indefinite"/>
+                      </p:stCondLst>
+                      <p:childTnLst>
+                        <p:par>
+                          <p:cTn id="16" fill="hold">
+                            <p:stCondLst>
+                              <p:cond delay="0"/>
+                            </p:stCondLst>
+                            <p:childTnLst>
+                              <p:par>
+                                <p:cTn id="17" presetID="1" presetClass="entr" presetSubtype="0" fill="hold" nodeType="clickEffect">
+                                  <p:stCondLst>
+                                    <p:cond delay="0"/>
+                                  </p:stCondLst>
+                                  <p:childTnLst>
+                                    <p:set>
+                                      <p:cBhvr>
+                                        <p:cTn id="18" dur="1" fill="hold">
+                                          <p:stCondLst>
+                                            <p:cond delay="0"/>
+                                          </p:stCondLst>
+                                        </p:cTn>
+                                        <p:tgtEl>
+                                          <p:spTgt spid="3">
+                                            <p:txEl>
+                                              <p:pRg st="6" end="6"/>
                                             </p:txEl>
                                           </p:spTgt>
                                         </p:tgtEl>
@@ -11307,7 +11365,7 @@
           <a:p>
             <a:r>
               <a:rPr lang="en-US" dirty="0"/>
-              <a:t>My work: </a:t>
+              <a:t>Prior projects: </a:t>
             </a:r>
             <a:r>
               <a:rPr lang="en-US" dirty="0" err="1"/>
@@ -18029,7 +18087,7 @@
             </a:r>
             <a:r>
               <a:rPr lang="en-US" sz="3200" dirty="0"/>
-              <a:t> prevention/measurement/congestion control/load balancing …</a:t>
+              <a:t> prevention/measurement/congestion control/load balancing/X?</a:t>
             </a:r>
           </a:p>
           <a:p>

</xml_diff>

<commit_message>
Don't overuse the word context
</commit_message>
<xml_diff>
--- a/nyu_wireless.pptx
+++ b/nyu_wireless.pptx
@@ -6024,8 +6024,13 @@
             </a:r>
             <a:r>
               <a:rPr lang="en-US" dirty="0"/>
-              <a:t> and cellular contexts</a:t>
+              <a:t> and </a:t>
             </a:r>
+            <a:r>
+              <a:rPr lang="en-US"/>
+              <a:t>cellular networks</a:t>
+            </a:r>
+            <a:endParaRPr lang="en-US" dirty="0"/>
           </a:p>
           <a:p>
             <a:pPr lvl="1"/>

</xml_diff>

<commit_message>
Simplify a bit further
</commit_message>
<xml_diff>
--- a/nyu_wireless.pptx
+++ b/nyu_wireless.pptx
@@ -5,19 +5,18 @@
     <p:sldMasterId id="2147483648" r:id="rId1"/>
   </p:sldMasterIdLst>
   <p:notesMasterIdLst>
-    <p:notesMasterId r:id="rId12"/>
+    <p:notesMasterId r:id="rId11"/>
   </p:notesMasterIdLst>
   <p:sldIdLst>
     <p:sldId id="256" r:id="rId2"/>
-    <p:sldId id="639" r:id="rId3"/>
-    <p:sldId id="315" r:id="rId4"/>
-    <p:sldId id="316" r:id="rId5"/>
-    <p:sldId id="529" r:id="rId6"/>
-    <p:sldId id="319" r:id="rId7"/>
-    <p:sldId id="527" r:id="rId8"/>
-    <p:sldId id="358" r:id="rId9"/>
-    <p:sldId id="635" r:id="rId10"/>
-    <p:sldId id="638" r:id="rId11"/>
+    <p:sldId id="315" r:id="rId3"/>
+    <p:sldId id="316" r:id="rId4"/>
+    <p:sldId id="529" r:id="rId5"/>
+    <p:sldId id="319" r:id="rId6"/>
+    <p:sldId id="527" r:id="rId7"/>
+    <p:sldId id="358" r:id="rId8"/>
+    <p:sldId id="635" r:id="rId9"/>
+    <p:sldId id="638" r:id="rId10"/>
   </p:sldIdLst>
   <p:sldSz cx="12192000" cy="6858000"/>
   <p:notesSz cx="6858000" cy="9144000"/>
@@ -2071,24 +2070,18 @@
           <a:bodyPr/>
           <a:lstStyle/>
           <a:p>
-            <a:pPr marL="0" marR="0" indent="0" algn="l" defTabSz="914400" rtl="0" eaLnBrk="1" fontAlgn="auto" latinLnBrk="0" hangingPunct="1">
-              <a:lnSpc>
-                <a:spcPct val="100000"/>
-              </a:lnSpc>
-              <a:spcBef>
-                <a:spcPts val="0"/>
-              </a:spcBef>
-              <a:spcAft>
-                <a:spcPts val="0"/>
-              </a:spcAft>
-              <a:buClrTx/>
-              <a:buSzTx/>
-              <a:buFontTx/>
-              <a:buNone/>
-              <a:tabLst/>
-              <a:defRPr/>
-            </a:pPr>
-            <a:endParaRPr lang="en-US" baseline="0" dirty="0"/>
+            <a:r>
+              <a:rPr lang="en-US" dirty="0"/>
+              <a:t>I’ll start with some motivation for fast and programmable networks and then talk </a:t>
+            </a:r>
+            <a:r>
+              <a:rPr lang="en-US"/>
+              <a:t>about my past</a:t>
+            </a:r>
+            <a:r>
+              <a:rPr lang="en-US" dirty="0"/>
+              <a:t>, current, and future work in this space.</a:t>
+            </a:r>
           </a:p>
         </p:txBody>
       </p:sp>
@@ -2109,7 +2102,7 @@
           <a:p>
             <a:fld id="{16B09458-7AEF-4AD3-A567-0F11380064BE}" type="slidenum">
               <a:rPr lang="en-US" smtClean="0"/>
-              <a:t>3</a:t>
+              <a:t>2</a:t>
             </a:fld>
             <a:endParaRPr lang="en-US"/>
           </a:p>
@@ -2303,7 +2296,7 @@
           <a:p>
             <a:fld id="{16B09458-7AEF-4AD3-A567-0F11380064BE}" type="slidenum">
               <a:rPr lang="en-US" smtClean="0"/>
-              <a:t>4</a:t>
+              <a:t>3</a:t>
             </a:fld>
             <a:endParaRPr lang="en-US"/>
           </a:p>
@@ -2404,7 +2397,7 @@
           <a:p>
             <a:fld id="{16B09458-7AEF-4AD3-A567-0F11380064BE}" type="slidenum">
               <a:rPr lang="en-US" smtClean="0"/>
-              <a:t>5</a:t>
+              <a:t>4</a:t>
             </a:fld>
             <a:endParaRPr lang="en-US"/>
           </a:p>
@@ -2488,7 +2481,7 @@
           <a:p>
             <a:fld id="{16B09458-7AEF-4AD3-A567-0F11380064BE}" type="slidenum">
               <a:rPr lang="en-US" smtClean="0"/>
-              <a:t>6</a:t>
+              <a:t>5</a:t>
             </a:fld>
             <a:endParaRPr lang="en-US"/>
           </a:p>
@@ -2592,7 +2585,7 @@
           <a:p>
             <a:fld id="{6C7315F8-E931-49D1-A989-C1759F952B9E}" type="slidenum">
               <a:rPr lang="en-US" smtClean="0"/>
-              <a:t>7</a:t>
+              <a:t>6</a:t>
             </a:fld>
             <a:endParaRPr lang="en-US"/>
           </a:p>
@@ -2679,7 +2672,7 @@
           <a:p>
             <a:fld id="{16B09458-7AEF-4AD3-A567-0F11380064BE}" type="slidenum">
               <a:rPr lang="en-US" smtClean="0"/>
-              <a:t>8</a:t>
+              <a:t>7</a:t>
             </a:fld>
             <a:endParaRPr lang="en-US"/>
           </a:p>
@@ -2945,7 +2938,7 @@
           <a:p>
             <a:fld id="{16B09458-7AEF-4AD3-A567-0F11380064BE}" type="slidenum">
               <a:rPr lang="en-US" smtClean="0"/>
-              <a:t>9</a:t>
+              <a:t>8</a:t>
             </a:fld>
             <a:endParaRPr lang="en-US"/>
           </a:p>
@@ -5944,698 +5937,7 @@
 </p:sld>
 </file>
 
-<file path=ppt/slides/slide10.xml><?xml version="1.0" encoding="utf-8"?>
-<p:sld xmlns:a="http://schemas.openxmlformats.org/drawingml/2006/main" xmlns:r="http://schemas.openxmlformats.org/officeDocument/2006/relationships" xmlns:p="http://schemas.openxmlformats.org/presentationml/2006/main">
-  <p:cSld>
-    <p:spTree>
-      <p:nvGrpSpPr>
-        <p:cNvPr id="1" name=""/>
-        <p:cNvGrpSpPr/>
-        <p:nvPr/>
-      </p:nvGrpSpPr>
-      <p:grpSpPr>
-        <a:xfrm>
-          <a:off x="0" y="0"/>
-          <a:ext cx="0" cy="0"/>
-          <a:chOff x="0" y="0"/>
-          <a:chExt cx="0" cy="0"/>
-        </a:xfrm>
-      </p:grpSpPr>
-      <p:sp>
-        <p:nvSpPr>
-          <p:cNvPr id="2" name="Title 1">
-            <a:extLst>
-              <a:ext uri="{FF2B5EF4-FFF2-40B4-BE49-F238E27FC236}">
-                <a16:creationId xmlns:a16="http://schemas.microsoft.com/office/drawing/2014/main" id="{C6B5C826-A71E-0941-BB10-25AECA241228}"/>
-              </a:ext>
-            </a:extLst>
-          </p:cNvPr>
-          <p:cNvSpPr>
-            <a:spLocks noGrp="1"/>
-          </p:cNvSpPr>
-          <p:nvPr>
-            <p:ph type="title"/>
-          </p:nvPr>
-        </p:nvSpPr>
-        <p:spPr/>
-        <p:txBody>
-          <a:bodyPr/>
-          <a:lstStyle/>
-          <a:p>
-            <a:r>
-              <a:rPr lang="en-US" dirty="0" err="1"/>
-              <a:t>Hardware+software</a:t>
-            </a:r>
-            <a:r>
-              <a:rPr lang="en-US" dirty="0"/>
-              <a:t> for wireless</a:t>
-            </a:r>
-          </a:p>
-        </p:txBody>
-      </p:sp>
-      <p:sp>
-        <p:nvSpPr>
-          <p:cNvPr id="3" name="Content Placeholder 2">
-            <a:extLst>
-              <a:ext uri="{FF2B5EF4-FFF2-40B4-BE49-F238E27FC236}">
-                <a16:creationId xmlns:a16="http://schemas.microsoft.com/office/drawing/2014/main" id="{F15718A9-624E-ED42-A593-F3C1EF3B3181}"/>
-              </a:ext>
-            </a:extLst>
-          </p:cNvPr>
-          <p:cNvSpPr>
-            <a:spLocks noGrp="1"/>
-          </p:cNvSpPr>
-          <p:nvPr>
-            <p:ph idx="1"/>
-          </p:nvPr>
-        </p:nvSpPr>
-        <p:spPr/>
-        <p:txBody>
-          <a:bodyPr/>
-          <a:lstStyle/>
-          <a:p>
-            <a:r>
-              <a:rPr lang="en-US" dirty="0"/>
-              <a:t>Significant packet processing in both </a:t>
-            </a:r>
-            <a:r>
-              <a:rPr lang="en-US" dirty="0" err="1"/>
-              <a:t>WiFi</a:t>
-            </a:r>
-            <a:r>
-              <a:rPr lang="en-US" dirty="0"/>
-              <a:t> and </a:t>
-            </a:r>
-            <a:r>
-              <a:rPr lang="en-US"/>
-              <a:t>cellular networks</a:t>
-            </a:r>
-            <a:endParaRPr lang="en-US" dirty="0"/>
-          </a:p>
-          <a:p>
-            <a:pPr lvl="1"/>
-            <a:r>
-              <a:rPr lang="en-US" dirty="0"/>
-              <a:t>Especially in the context of the physical layer</a:t>
-            </a:r>
-          </a:p>
-          <a:p>
-            <a:endParaRPr lang="en-US" dirty="0"/>
-          </a:p>
-          <a:p>
-            <a:r>
-              <a:rPr lang="en-US" dirty="0"/>
-              <a:t>Designing hardware accelerators for emerging technologies (e.g., 5G)</a:t>
-            </a:r>
-          </a:p>
-          <a:p>
-            <a:pPr lvl="1"/>
-            <a:r>
-              <a:rPr lang="en-US" dirty="0"/>
-              <a:t>Splitting the wireless stack between the host processor and an accelerator</a:t>
-            </a:r>
-          </a:p>
-        </p:txBody>
-      </p:sp>
-    </p:spTree>
-    <p:extLst>
-      <p:ext uri="{BB962C8B-B14F-4D97-AF65-F5344CB8AC3E}">
-        <p14:creationId xmlns:p14="http://schemas.microsoft.com/office/powerpoint/2010/main" val="2815709453"/>
-      </p:ext>
-    </p:extLst>
-  </p:cSld>
-  <p:clrMapOvr>
-    <a:masterClrMapping/>
-  </p:clrMapOvr>
-  <p:timing>
-    <p:tnLst>
-      <p:par>
-        <p:cTn id="1" dur="indefinite" restart="never" nodeType="tmRoot">
-          <p:childTnLst>
-            <p:seq concurrent="1" nextAc="seek">
-              <p:cTn id="2" dur="indefinite" nodeType="mainSeq">
-                <p:childTnLst>
-                  <p:par>
-                    <p:cTn id="3" fill="hold">
-                      <p:stCondLst>
-                        <p:cond delay="indefinite"/>
-                      </p:stCondLst>
-                      <p:childTnLst>
-                        <p:par>
-                          <p:cTn id="4" fill="hold">
-                            <p:stCondLst>
-                              <p:cond delay="0"/>
-                            </p:stCondLst>
-                            <p:childTnLst>
-                              <p:par>
-                                <p:cTn id="5" presetID="1" presetClass="entr" presetSubtype="0" fill="hold" nodeType="clickEffect">
-                                  <p:stCondLst>
-                                    <p:cond delay="0"/>
-                                  </p:stCondLst>
-                                  <p:childTnLst>
-                                    <p:set>
-                                      <p:cBhvr>
-                                        <p:cTn id="6" dur="1" fill="hold">
-                                          <p:stCondLst>
-                                            <p:cond delay="0"/>
-                                          </p:stCondLst>
-                                        </p:cTn>
-                                        <p:tgtEl>
-                                          <p:spTgt spid="3">
-                                            <p:txEl>
-                                              <p:pRg st="0" end="0"/>
-                                            </p:txEl>
-                                          </p:spTgt>
-                                        </p:tgtEl>
-                                        <p:attrNameLst>
-                                          <p:attrName>style.visibility</p:attrName>
-                                        </p:attrNameLst>
-                                      </p:cBhvr>
-                                      <p:to>
-                                        <p:strVal val="visible"/>
-                                      </p:to>
-                                    </p:set>
-                                  </p:childTnLst>
-                                </p:cTn>
-                              </p:par>
-                            </p:childTnLst>
-                          </p:cTn>
-                        </p:par>
-                      </p:childTnLst>
-                    </p:cTn>
-                  </p:par>
-                  <p:par>
-                    <p:cTn id="7" fill="hold">
-                      <p:stCondLst>
-                        <p:cond delay="indefinite"/>
-                      </p:stCondLst>
-                      <p:childTnLst>
-                        <p:par>
-                          <p:cTn id="8" fill="hold">
-                            <p:stCondLst>
-                              <p:cond delay="0"/>
-                            </p:stCondLst>
-                            <p:childTnLst>
-                              <p:par>
-                                <p:cTn id="9" presetID="1" presetClass="entr" presetSubtype="0" fill="hold" nodeType="clickEffect">
-                                  <p:stCondLst>
-                                    <p:cond delay="0"/>
-                                  </p:stCondLst>
-                                  <p:childTnLst>
-                                    <p:set>
-                                      <p:cBhvr>
-                                        <p:cTn id="10" dur="1" fill="hold">
-                                          <p:stCondLst>
-                                            <p:cond delay="0"/>
-                                          </p:stCondLst>
-                                        </p:cTn>
-                                        <p:tgtEl>
-                                          <p:spTgt spid="3">
-                                            <p:txEl>
-                                              <p:pRg st="1" end="1"/>
-                                            </p:txEl>
-                                          </p:spTgt>
-                                        </p:tgtEl>
-                                        <p:attrNameLst>
-                                          <p:attrName>style.visibility</p:attrName>
-                                        </p:attrNameLst>
-                                      </p:cBhvr>
-                                      <p:to>
-                                        <p:strVal val="visible"/>
-                                      </p:to>
-                                    </p:set>
-                                  </p:childTnLst>
-                                </p:cTn>
-                              </p:par>
-                            </p:childTnLst>
-                          </p:cTn>
-                        </p:par>
-                      </p:childTnLst>
-                    </p:cTn>
-                  </p:par>
-                  <p:par>
-                    <p:cTn id="11" fill="hold">
-                      <p:stCondLst>
-                        <p:cond delay="indefinite"/>
-                      </p:stCondLst>
-                      <p:childTnLst>
-                        <p:par>
-                          <p:cTn id="12" fill="hold">
-                            <p:stCondLst>
-                              <p:cond delay="0"/>
-                            </p:stCondLst>
-                            <p:childTnLst>
-                              <p:par>
-                                <p:cTn id="13" presetID="1" presetClass="entr" presetSubtype="0" fill="hold" nodeType="clickEffect">
-                                  <p:stCondLst>
-                                    <p:cond delay="0"/>
-                                  </p:stCondLst>
-                                  <p:childTnLst>
-                                    <p:set>
-                                      <p:cBhvr>
-                                        <p:cTn id="14" dur="1" fill="hold">
-                                          <p:stCondLst>
-                                            <p:cond delay="0"/>
-                                          </p:stCondLst>
-                                        </p:cTn>
-                                        <p:tgtEl>
-                                          <p:spTgt spid="3">
-                                            <p:txEl>
-                                              <p:pRg st="3" end="3"/>
-                                            </p:txEl>
-                                          </p:spTgt>
-                                        </p:tgtEl>
-                                        <p:attrNameLst>
-                                          <p:attrName>style.visibility</p:attrName>
-                                        </p:attrNameLst>
-                                      </p:cBhvr>
-                                      <p:to>
-                                        <p:strVal val="visible"/>
-                                      </p:to>
-                                    </p:set>
-                                  </p:childTnLst>
-                                </p:cTn>
-                              </p:par>
-                            </p:childTnLst>
-                          </p:cTn>
-                        </p:par>
-                      </p:childTnLst>
-                    </p:cTn>
-                  </p:par>
-                  <p:par>
-                    <p:cTn id="15" fill="hold">
-                      <p:stCondLst>
-                        <p:cond delay="indefinite"/>
-                      </p:stCondLst>
-                      <p:childTnLst>
-                        <p:par>
-                          <p:cTn id="16" fill="hold">
-                            <p:stCondLst>
-                              <p:cond delay="0"/>
-                            </p:stCondLst>
-                            <p:childTnLst>
-                              <p:par>
-                                <p:cTn id="17" presetID="1" presetClass="entr" presetSubtype="0" fill="hold" nodeType="clickEffect">
-                                  <p:stCondLst>
-                                    <p:cond delay="0"/>
-                                  </p:stCondLst>
-                                  <p:childTnLst>
-                                    <p:set>
-                                      <p:cBhvr>
-                                        <p:cTn id="18" dur="1" fill="hold">
-                                          <p:stCondLst>
-                                            <p:cond delay="0"/>
-                                          </p:stCondLst>
-                                        </p:cTn>
-                                        <p:tgtEl>
-                                          <p:spTgt spid="3">
-                                            <p:txEl>
-                                              <p:pRg st="4" end="4"/>
-                                            </p:txEl>
-                                          </p:spTgt>
-                                        </p:tgtEl>
-                                        <p:attrNameLst>
-                                          <p:attrName>style.visibility</p:attrName>
-                                        </p:attrNameLst>
-                                      </p:cBhvr>
-                                      <p:to>
-                                        <p:strVal val="visible"/>
-                                      </p:to>
-                                    </p:set>
-                                  </p:childTnLst>
-                                </p:cTn>
-                              </p:par>
-                            </p:childTnLst>
-                          </p:cTn>
-                        </p:par>
-                      </p:childTnLst>
-                    </p:cTn>
-                  </p:par>
-                </p:childTnLst>
-              </p:cTn>
-              <p:prevCondLst>
-                <p:cond evt="onPrev" delay="0">
-                  <p:tgtEl>
-                    <p:sldTgt/>
-                  </p:tgtEl>
-                </p:cond>
-              </p:prevCondLst>
-              <p:nextCondLst>
-                <p:cond evt="onNext" delay="0">
-                  <p:tgtEl>
-                    <p:sldTgt/>
-                  </p:tgtEl>
-                </p:cond>
-              </p:nextCondLst>
-            </p:seq>
-          </p:childTnLst>
-        </p:cTn>
-      </p:par>
-    </p:tnLst>
-  </p:timing>
-</p:sld>
-</file>
-
 <file path=ppt/slides/slide2.xml><?xml version="1.0" encoding="utf-8"?>
-<p:sld xmlns:a="http://schemas.openxmlformats.org/drawingml/2006/main" xmlns:r="http://schemas.openxmlformats.org/officeDocument/2006/relationships" xmlns:p="http://schemas.openxmlformats.org/presentationml/2006/main">
-  <p:cSld>
-    <p:spTree>
-      <p:nvGrpSpPr>
-        <p:cNvPr id="1" name=""/>
-        <p:cNvGrpSpPr/>
-        <p:nvPr/>
-      </p:nvGrpSpPr>
-      <p:grpSpPr>
-        <a:xfrm>
-          <a:off x="0" y="0"/>
-          <a:ext cx="0" cy="0"/>
-          <a:chOff x="0" y="0"/>
-          <a:chExt cx="0" cy="0"/>
-        </a:xfrm>
-      </p:grpSpPr>
-      <p:sp>
-        <p:nvSpPr>
-          <p:cNvPr id="2" name="Title 1">
-            <a:extLst>
-              <a:ext uri="{FF2B5EF4-FFF2-40B4-BE49-F238E27FC236}">
-                <a16:creationId xmlns:a16="http://schemas.microsoft.com/office/drawing/2014/main" id="{370F27E4-6EFC-AF4A-B3A6-089A180F232F}"/>
-              </a:ext>
-            </a:extLst>
-          </p:cNvPr>
-          <p:cNvSpPr>
-            <a:spLocks noGrp="1"/>
-          </p:cNvSpPr>
-          <p:nvPr>
-            <p:ph type="title"/>
-          </p:nvPr>
-        </p:nvSpPr>
-        <p:spPr/>
-        <p:txBody>
-          <a:bodyPr/>
-          <a:lstStyle/>
-          <a:p>
-            <a:r>
-              <a:rPr lang="en-US" dirty="0"/>
-              <a:t>Outline</a:t>
-            </a:r>
-          </a:p>
-        </p:txBody>
-      </p:sp>
-      <p:sp>
-        <p:nvSpPr>
-          <p:cNvPr id="3" name="Content Placeholder 2">
-            <a:extLst>
-              <a:ext uri="{FF2B5EF4-FFF2-40B4-BE49-F238E27FC236}">
-                <a16:creationId xmlns:a16="http://schemas.microsoft.com/office/drawing/2014/main" id="{BD9DBDEF-6A16-8645-9908-C8D2D61978E4}"/>
-              </a:ext>
-            </a:extLst>
-          </p:cNvPr>
-          <p:cNvSpPr>
-            <a:spLocks noGrp="1"/>
-          </p:cNvSpPr>
-          <p:nvPr>
-            <p:ph idx="1"/>
-          </p:nvPr>
-        </p:nvSpPr>
-        <p:spPr/>
-        <p:txBody>
-          <a:bodyPr/>
-          <a:lstStyle/>
-          <a:p>
-            <a:r>
-              <a:rPr lang="en-US" dirty="0"/>
-              <a:t>Motivation for fast and programmable networks</a:t>
-            </a:r>
-          </a:p>
-          <a:p>
-            <a:endParaRPr lang="en-US" dirty="0"/>
-          </a:p>
-          <a:p>
-            <a:r>
-              <a:rPr lang="en-US" dirty="0"/>
-              <a:t>Previous work: Designing fast and programmable routers</a:t>
-            </a:r>
-          </a:p>
-          <a:p>
-            <a:endParaRPr lang="en-US" dirty="0"/>
-          </a:p>
-          <a:p>
-            <a:r>
-              <a:rPr lang="en-US" dirty="0"/>
-              <a:t>Ongoing work: How should programmable routers be used?</a:t>
-            </a:r>
-          </a:p>
-          <a:p>
-            <a:endParaRPr lang="en-US" dirty="0"/>
-          </a:p>
-          <a:p>
-            <a:r>
-              <a:rPr lang="en-US" dirty="0"/>
-              <a:t>Future work: Programmable network infrastructure for wireless</a:t>
-            </a:r>
-          </a:p>
-        </p:txBody>
-      </p:sp>
-    </p:spTree>
-    <p:extLst>
-      <p:ext uri="{BB962C8B-B14F-4D97-AF65-F5344CB8AC3E}">
-        <p14:creationId xmlns:p14="http://schemas.microsoft.com/office/powerpoint/2010/main" val="609632705"/>
-      </p:ext>
-    </p:extLst>
-  </p:cSld>
-  <p:clrMapOvr>
-    <a:masterClrMapping/>
-  </p:clrMapOvr>
-  <p:timing>
-    <p:tnLst>
-      <p:par>
-        <p:cTn id="1" dur="indefinite" restart="never" nodeType="tmRoot">
-          <p:childTnLst>
-            <p:seq concurrent="1" nextAc="seek">
-              <p:cTn id="2" dur="indefinite" nodeType="mainSeq">
-                <p:childTnLst>
-                  <p:par>
-                    <p:cTn id="3" fill="hold">
-                      <p:stCondLst>
-                        <p:cond delay="indefinite"/>
-                      </p:stCondLst>
-                      <p:childTnLst>
-                        <p:par>
-                          <p:cTn id="4" fill="hold">
-                            <p:stCondLst>
-                              <p:cond delay="0"/>
-                            </p:stCondLst>
-                            <p:childTnLst>
-                              <p:par>
-                                <p:cTn id="5" presetID="1" presetClass="entr" presetSubtype="0" fill="hold" nodeType="clickEffect">
-                                  <p:stCondLst>
-                                    <p:cond delay="0"/>
-                                  </p:stCondLst>
-                                  <p:childTnLst>
-                                    <p:set>
-                                      <p:cBhvr>
-                                        <p:cTn id="6" dur="1" fill="hold">
-                                          <p:stCondLst>
-                                            <p:cond delay="0"/>
-                                          </p:stCondLst>
-                                        </p:cTn>
-                                        <p:tgtEl>
-                                          <p:spTgt spid="3">
-                                            <p:txEl>
-                                              <p:pRg st="0" end="0"/>
-                                            </p:txEl>
-                                          </p:spTgt>
-                                        </p:tgtEl>
-                                        <p:attrNameLst>
-                                          <p:attrName>style.visibility</p:attrName>
-                                        </p:attrNameLst>
-                                      </p:cBhvr>
-                                      <p:to>
-                                        <p:strVal val="visible"/>
-                                      </p:to>
-                                    </p:set>
-                                  </p:childTnLst>
-                                </p:cTn>
-                              </p:par>
-                            </p:childTnLst>
-                          </p:cTn>
-                        </p:par>
-                      </p:childTnLst>
-                    </p:cTn>
-                  </p:par>
-                  <p:par>
-                    <p:cTn id="7" fill="hold">
-                      <p:stCondLst>
-                        <p:cond delay="indefinite"/>
-                      </p:stCondLst>
-                      <p:childTnLst>
-                        <p:par>
-                          <p:cTn id="8" fill="hold">
-                            <p:stCondLst>
-                              <p:cond delay="0"/>
-                            </p:stCondLst>
-                            <p:childTnLst>
-                              <p:par>
-                                <p:cTn id="9" presetID="1" presetClass="entr" presetSubtype="0" fill="hold" nodeType="clickEffect">
-                                  <p:stCondLst>
-                                    <p:cond delay="0"/>
-                                  </p:stCondLst>
-                                  <p:childTnLst>
-                                    <p:set>
-                                      <p:cBhvr>
-                                        <p:cTn id="10" dur="1" fill="hold">
-                                          <p:stCondLst>
-                                            <p:cond delay="0"/>
-                                          </p:stCondLst>
-                                        </p:cTn>
-                                        <p:tgtEl>
-                                          <p:spTgt spid="3">
-                                            <p:txEl>
-                                              <p:pRg st="2" end="2"/>
-                                            </p:txEl>
-                                          </p:spTgt>
-                                        </p:tgtEl>
-                                        <p:attrNameLst>
-                                          <p:attrName>style.visibility</p:attrName>
-                                        </p:attrNameLst>
-                                      </p:cBhvr>
-                                      <p:to>
-                                        <p:strVal val="visible"/>
-                                      </p:to>
-                                    </p:set>
-                                  </p:childTnLst>
-                                </p:cTn>
-                              </p:par>
-                            </p:childTnLst>
-                          </p:cTn>
-                        </p:par>
-                      </p:childTnLst>
-                    </p:cTn>
-                  </p:par>
-                  <p:par>
-                    <p:cTn id="11" fill="hold">
-                      <p:stCondLst>
-                        <p:cond delay="indefinite"/>
-                      </p:stCondLst>
-                      <p:childTnLst>
-                        <p:par>
-                          <p:cTn id="12" fill="hold">
-                            <p:stCondLst>
-                              <p:cond delay="0"/>
-                            </p:stCondLst>
-                            <p:childTnLst>
-                              <p:par>
-                                <p:cTn id="13" presetID="1" presetClass="entr" presetSubtype="0" fill="hold" nodeType="clickEffect">
-                                  <p:stCondLst>
-                                    <p:cond delay="0"/>
-                                  </p:stCondLst>
-                                  <p:childTnLst>
-                                    <p:set>
-                                      <p:cBhvr>
-                                        <p:cTn id="14" dur="1" fill="hold">
-                                          <p:stCondLst>
-                                            <p:cond delay="0"/>
-                                          </p:stCondLst>
-                                        </p:cTn>
-                                        <p:tgtEl>
-                                          <p:spTgt spid="3">
-                                            <p:txEl>
-                                              <p:pRg st="4" end="4"/>
-                                            </p:txEl>
-                                          </p:spTgt>
-                                        </p:tgtEl>
-                                        <p:attrNameLst>
-                                          <p:attrName>style.visibility</p:attrName>
-                                        </p:attrNameLst>
-                                      </p:cBhvr>
-                                      <p:to>
-                                        <p:strVal val="visible"/>
-                                      </p:to>
-                                    </p:set>
-                                  </p:childTnLst>
-                                </p:cTn>
-                              </p:par>
-                            </p:childTnLst>
-                          </p:cTn>
-                        </p:par>
-                      </p:childTnLst>
-                    </p:cTn>
-                  </p:par>
-                  <p:par>
-                    <p:cTn id="15" fill="hold">
-                      <p:stCondLst>
-                        <p:cond delay="indefinite"/>
-                      </p:stCondLst>
-                      <p:childTnLst>
-                        <p:par>
-                          <p:cTn id="16" fill="hold">
-                            <p:stCondLst>
-                              <p:cond delay="0"/>
-                            </p:stCondLst>
-                            <p:childTnLst>
-                              <p:par>
-                                <p:cTn id="17" presetID="1" presetClass="entr" presetSubtype="0" fill="hold" nodeType="clickEffect">
-                                  <p:stCondLst>
-                                    <p:cond delay="0"/>
-                                  </p:stCondLst>
-                                  <p:childTnLst>
-                                    <p:set>
-                                      <p:cBhvr>
-                                        <p:cTn id="18" dur="1" fill="hold">
-                                          <p:stCondLst>
-                                            <p:cond delay="0"/>
-                                          </p:stCondLst>
-                                        </p:cTn>
-                                        <p:tgtEl>
-                                          <p:spTgt spid="3">
-                                            <p:txEl>
-                                              <p:pRg st="6" end="6"/>
-                                            </p:txEl>
-                                          </p:spTgt>
-                                        </p:tgtEl>
-                                        <p:attrNameLst>
-                                          <p:attrName>style.visibility</p:attrName>
-                                        </p:attrNameLst>
-                                      </p:cBhvr>
-                                      <p:to>
-                                        <p:strVal val="visible"/>
-                                      </p:to>
-                                    </p:set>
-                                  </p:childTnLst>
-                                </p:cTn>
-                              </p:par>
-                            </p:childTnLst>
-                          </p:cTn>
-                        </p:par>
-                      </p:childTnLst>
-                    </p:cTn>
-                  </p:par>
-                </p:childTnLst>
-              </p:cTn>
-              <p:prevCondLst>
-                <p:cond evt="onPrev" delay="0">
-                  <p:tgtEl>
-                    <p:sldTgt/>
-                  </p:tgtEl>
-                </p:cond>
-              </p:prevCondLst>
-              <p:nextCondLst>
-                <p:cond evt="onNext" delay="0">
-                  <p:tgtEl>
-                    <p:sldTgt/>
-                  </p:tgtEl>
-                </p:cond>
-              </p:nextCondLst>
-            </p:seq>
-          </p:childTnLst>
-        </p:cTn>
-      </p:par>
-    </p:tnLst>
-  </p:timing>
-</p:sld>
-</file>
-
-<file path=ppt/slides/slide3.xml><?xml version="1.0" encoding="utf-8"?>
 <p:sld xmlns:a="http://schemas.openxmlformats.org/drawingml/2006/main" xmlns:r="http://schemas.openxmlformats.org/officeDocument/2006/relationships" xmlns:p="http://schemas.openxmlformats.org/presentationml/2006/main">
   <p:cSld>
     <p:spTree>
@@ -7406,7 +6708,7 @@
 </p:sld>
 </file>
 
-<file path=ppt/slides/slide4.xml><?xml version="1.0" encoding="utf-8"?>
+<file path=ppt/slides/slide3.xml><?xml version="1.0" encoding="utf-8"?>
 <p:sld xmlns:a="http://schemas.openxmlformats.org/drawingml/2006/main" xmlns:r="http://schemas.openxmlformats.org/officeDocument/2006/relationships" xmlns:p="http://schemas.openxmlformats.org/presentationml/2006/main">
   <p:cSld>
     <p:spTree>
@@ -8967,7 +8269,7 @@
 </p:sld>
 </file>
 
-<file path=ppt/slides/slide5.xml><?xml version="1.0" encoding="utf-8"?>
+<file path=ppt/slides/slide4.xml><?xml version="1.0" encoding="utf-8"?>
 <p:sld xmlns:a="http://schemas.openxmlformats.org/drawingml/2006/main" xmlns:r="http://schemas.openxmlformats.org/officeDocument/2006/relationships" xmlns:p="http://schemas.openxmlformats.org/presentationml/2006/main">
   <p:cSld>
     <p:spTree>
@@ -10535,7 +9837,7 @@
 </p:sld>
 </file>
 
-<file path=ppt/slides/slide6.xml><?xml version="1.0" encoding="utf-8"?>
+<file path=ppt/slides/slide5.xml><?xml version="1.0" encoding="utf-8"?>
 <p:sld xmlns:a="http://schemas.openxmlformats.org/drawingml/2006/main" xmlns:r="http://schemas.openxmlformats.org/officeDocument/2006/relationships" xmlns:p="http://schemas.openxmlformats.org/presentationml/2006/main">
   <p:cSld>
     <p:spTree>
@@ -11336,7 +10638,7 @@
 </p:sld>
 </file>
 
-<file path=ppt/slides/slide7.xml><?xml version="1.0" encoding="utf-8"?>
+<file path=ppt/slides/slide6.xml><?xml version="1.0" encoding="utf-8"?>
 <p:sld xmlns:a="http://schemas.openxmlformats.org/drawingml/2006/main" xmlns:r="http://schemas.openxmlformats.org/officeDocument/2006/relationships" xmlns:p="http://schemas.openxmlformats.org/presentationml/2006/main">
   <p:cSld>
     <p:spTree>
@@ -17748,7 +17050,7 @@
 </p:sld>
 </file>
 
-<file path=ppt/slides/slide8.xml><?xml version="1.0" encoding="utf-8"?>
+<file path=ppt/slides/slide7.xml><?xml version="1.0" encoding="utf-8"?>
 <p:sld xmlns:a="http://schemas.openxmlformats.org/drawingml/2006/main" xmlns:r="http://schemas.openxmlformats.org/officeDocument/2006/relationships" xmlns:p="http://schemas.openxmlformats.org/presentationml/2006/main">
   <p:cSld>
     <p:spTree>
@@ -17991,7 +17293,7 @@
 </p:sld>
 </file>
 
-<file path=ppt/slides/slide9.xml><?xml version="1.0" encoding="utf-8"?>
+<file path=ppt/slides/slide8.xml><?xml version="1.0" encoding="utf-8"?>
 <p:sld xmlns:a="http://schemas.openxmlformats.org/drawingml/2006/main" xmlns:r="http://schemas.openxmlformats.org/officeDocument/2006/relationships" xmlns:p="http://schemas.openxmlformats.org/presentationml/2006/main">
   <p:cSld>
     <p:spTree>
@@ -18338,6 +17640,358 @@
                                     <p:set>
                                       <p:cBhvr>
                                         <p:cTn id="22" dur="1" fill="hold">
+                                          <p:stCondLst>
+                                            <p:cond delay="0"/>
+                                          </p:stCondLst>
+                                        </p:cTn>
+                                        <p:tgtEl>
+                                          <p:spTgt spid="3">
+                                            <p:txEl>
+                                              <p:pRg st="4" end="4"/>
+                                            </p:txEl>
+                                          </p:spTgt>
+                                        </p:tgtEl>
+                                        <p:attrNameLst>
+                                          <p:attrName>style.visibility</p:attrName>
+                                        </p:attrNameLst>
+                                      </p:cBhvr>
+                                      <p:to>
+                                        <p:strVal val="visible"/>
+                                      </p:to>
+                                    </p:set>
+                                  </p:childTnLst>
+                                </p:cTn>
+                              </p:par>
+                            </p:childTnLst>
+                          </p:cTn>
+                        </p:par>
+                      </p:childTnLst>
+                    </p:cTn>
+                  </p:par>
+                </p:childTnLst>
+              </p:cTn>
+              <p:prevCondLst>
+                <p:cond evt="onPrev" delay="0">
+                  <p:tgtEl>
+                    <p:sldTgt/>
+                  </p:tgtEl>
+                </p:cond>
+              </p:prevCondLst>
+              <p:nextCondLst>
+                <p:cond evt="onNext" delay="0">
+                  <p:tgtEl>
+                    <p:sldTgt/>
+                  </p:tgtEl>
+                </p:cond>
+              </p:nextCondLst>
+            </p:seq>
+          </p:childTnLst>
+        </p:cTn>
+      </p:par>
+    </p:tnLst>
+  </p:timing>
+</p:sld>
+</file>
+
+<file path=ppt/slides/slide9.xml><?xml version="1.0" encoding="utf-8"?>
+<p:sld xmlns:a="http://schemas.openxmlformats.org/drawingml/2006/main" xmlns:r="http://schemas.openxmlformats.org/officeDocument/2006/relationships" xmlns:p="http://schemas.openxmlformats.org/presentationml/2006/main">
+  <p:cSld>
+    <p:spTree>
+      <p:nvGrpSpPr>
+        <p:cNvPr id="1" name=""/>
+        <p:cNvGrpSpPr/>
+        <p:nvPr/>
+      </p:nvGrpSpPr>
+      <p:grpSpPr>
+        <a:xfrm>
+          <a:off x="0" y="0"/>
+          <a:ext cx="0" cy="0"/>
+          <a:chOff x="0" y="0"/>
+          <a:chExt cx="0" cy="0"/>
+        </a:xfrm>
+      </p:grpSpPr>
+      <p:sp>
+        <p:nvSpPr>
+          <p:cNvPr id="2" name="Title 1">
+            <a:extLst>
+              <a:ext uri="{FF2B5EF4-FFF2-40B4-BE49-F238E27FC236}">
+                <a16:creationId xmlns:a16="http://schemas.microsoft.com/office/drawing/2014/main" id="{C6B5C826-A71E-0941-BB10-25AECA241228}"/>
+              </a:ext>
+            </a:extLst>
+          </p:cNvPr>
+          <p:cNvSpPr>
+            <a:spLocks noGrp="1"/>
+          </p:cNvSpPr>
+          <p:nvPr>
+            <p:ph type="title"/>
+          </p:nvPr>
+        </p:nvSpPr>
+        <p:spPr/>
+        <p:txBody>
+          <a:bodyPr/>
+          <a:lstStyle/>
+          <a:p>
+            <a:r>
+              <a:rPr lang="en-US" dirty="0" err="1"/>
+              <a:t>Hardware+software</a:t>
+            </a:r>
+            <a:r>
+              <a:rPr lang="en-US" dirty="0"/>
+              <a:t> for wireless</a:t>
+            </a:r>
+          </a:p>
+        </p:txBody>
+      </p:sp>
+      <p:sp>
+        <p:nvSpPr>
+          <p:cNvPr id="3" name="Content Placeholder 2">
+            <a:extLst>
+              <a:ext uri="{FF2B5EF4-FFF2-40B4-BE49-F238E27FC236}">
+                <a16:creationId xmlns:a16="http://schemas.microsoft.com/office/drawing/2014/main" id="{F15718A9-624E-ED42-A593-F3C1EF3B3181}"/>
+              </a:ext>
+            </a:extLst>
+          </p:cNvPr>
+          <p:cNvSpPr>
+            <a:spLocks noGrp="1"/>
+          </p:cNvSpPr>
+          <p:nvPr>
+            <p:ph idx="1"/>
+          </p:nvPr>
+        </p:nvSpPr>
+        <p:spPr/>
+        <p:txBody>
+          <a:bodyPr/>
+          <a:lstStyle/>
+          <a:p>
+            <a:r>
+              <a:rPr lang="en-US" dirty="0"/>
+              <a:t>Significant packet processing in both </a:t>
+            </a:r>
+            <a:r>
+              <a:rPr lang="en-US" dirty="0" err="1"/>
+              <a:t>WiFi</a:t>
+            </a:r>
+            <a:r>
+              <a:rPr lang="en-US" dirty="0"/>
+              <a:t> and </a:t>
+            </a:r>
+            <a:r>
+              <a:rPr lang="en-US"/>
+              <a:t>cellular networks</a:t>
+            </a:r>
+            <a:endParaRPr lang="en-US" dirty="0"/>
+          </a:p>
+          <a:p>
+            <a:pPr lvl="1"/>
+            <a:r>
+              <a:rPr lang="en-US" dirty="0"/>
+              <a:t>Especially in the context of the physical layer</a:t>
+            </a:r>
+          </a:p>
+          <a:p>
+            <a:endParaRPr lang="en-US" dirty="0"/>
+          </a:p>
+          <a:p>
+            <a:r>
+              <a:rPr lang="en-US" dirty="0"/>
+              <a:t>Designing hardware accelerators for emerging technologies (e.g., 5G)</a:t>
+            </a:r>
+          </a:p>
+          <a:p>
+            <a:pPr lvl="1"/>
+            <a:r>
+              <a:rPr lang="en-US" dirty="0"/>
+              <a:t>Splitting the wireless stack between the host processor and an accelerator</a:t>
+            </a:r>
+          </a:p>
+        </p:txBody>
+      </p:sp>
+    </p:spTree>
+    <p:extLst>
+      <p:ext uri="{BB962C8B-B14F-4D97-AF65-F5344CB8AC3E}">
+        <p14:creationId xmlns:p14="http://schemas.microsoft.com/office/powerpoint/2010/main" val="2815709453"/>
+      </p:ext>
+    </p:extLst>
+  </p:cSld>
+  <p:clrMapOvr>
+    <a:masterClrMapping/>
+  </p:clrMapOvr>
+  <p:timing>
+    <p:tnLst>
+      <p:par>
+        <p:cTn id="1" dur="indefinite" restart="never" nodeType="tmRoot">
+          <p:childTnLst>
+            <p:seq concurrent="1" nextAc="seek">
+              <p:cTn id="2" dur="indefinite" nodeType="mainSeq">
+                <p:childTnLst>
+                  <p:par>
+                    <p:cTn id="3" fill="hold">
+                      <p:stCondLst>
+                        <p:cond delay="indefinite"/>
+                      </p:stCondLst>
+                      <p:childTnLst>
+                        <p:par>
+                          <p:cTn id="4" fill="hold">
+                            <p:stCondLst>
+                              <p:cond delay="0"/>
+                            </p:stCondLst>
+                            <p:childTnLst>
+                              <p:par>
+                                <p:cTn id="5" presetID="1" presetClass="entr" presetSubtype="0" fill="hold" nodeType="clickEffect">
+                                  <p:stCondLst>
+                                    <p:cond delay="0"/>
+                                  </p:stCondLst>
+                                  <p:childTnLst>
+                                    <p:set>
+                                      <p:cBhvr>
+                                        <p:cTn id="6" dur="1" fill="hold">
+                                          <p:stCondLst>
+                                            <p:cond delay="0"/>
+                                          </p:stCondLst>
+                                        </p:cTn>
+                                        <p:tgtEl>
+                                          <p:spTgt spid="3">
+                                            <p:txEl>
+                                              <p:pRg st="0" end="0"/>
+                                            </p:txEl>
+                                          </p:spTgt>
+                                        </p:tgtEl>
+                                        <p:attrNameLst>
+                                          <p:attrName>style.visibility</p:attrName>
+                                        </p:attrNameLst>
+                                      </p:cBhvr>
+                                      <p:to>
+                                        <p:strVal val="visible"/>
+                                      </p:to>
+                                    </p:set>
+                                  </p:childTnLst>
+                                </p:cTn>
+                              </p:par>
+                            </p:childTnLst>
+                          </p:cTn>
+                        </p:par>
+                      </p:childTnLst>
+                    </p:cTn>
+                  </p:par>
+                  <p:par>
+                    <p:cTn id="7" fill="hold">
+                      <p:stCondLst>
+                        <p:cond delay="indefinite"/>
+                      </p:stCondLst>
+                      <p:childTnLst>
+                        <p:par>
+                          <p:cTn id="8" fill="hold">
+                            <p:stCondLst>
+                              <p:cond delay="0"/>
+                            </p:stCondLst>
+                            <p:childTnLst>
+                              <p:par>
+                                <p:cTn id="9" presetID="1" presetClass="entr" presetSubtype="0" fill="hold" nodeType="clickEffect">
+                                  <p:stCondLst>
+                                    <p:cond delay="0"/>
+                                  </p:stCondLst>
+                                  <p:childTnLst>
+                                    <p:set>
+                                      <p:cBhvr>
+                                        <p:cTn id="10" dur="1" fill="hold">
+                                          <p:stCondLst>
+                                            <p:cond delay="0"/>
+                                          </p:stCondLst>
+                                        </p:cTn>
+                                        <p:tgtEl>
+                                          <p:spTgt spid="3">
+                                            <p:txEl>
+                                              <p:pRg st="1" end="1"/>
+                                            </p:txEl>
+                                          </p:spTgt>
+                                        </p:tgtEl>
+                                        <p:attrNameLst>
+                                          <p:attrName>style.visibility</p:attrName>
+                                        </p:attrNameLst>
+                                      </p:cBhvr>
+                                      <p:to>
+                                        <p:strVal val="visible"/>
+                                      </p:to>
+                                    </p:set>
+                                  </p:childTnLst>
+                                </p:cTn>
+                              </p:par>
+                            </p:childTnLst>
+                          </p:cTn>
+                        </p:par>
+                      </p:childTnLst>
+                    </p:cTn>
+                  </p:par>
+                  <p:par>
+                    <p:cTn id="11" fill="hold">
+                      <p:stCondLst>
+                        <p:cond delay="indefinite"/>
+                      </p:stCondLst>
+                      <p:childTnLst>
+                        <p:par>
+                          <p:cTn id="12" fill="hold">
+                            <p:stCondLst>
+                              <p:cond delay="0"/>
+                            </p:stCondLst>
+                            <p:childTnLst>
+                              <p:par>
+                                <p:cTn id="13" presetID="1" presetClass="entr" presetSubtype="0" fill="hold" nodeType="clickEffect">
+                                  <p:stCondLst>
+                                    <p:cond delay="0"/>
+                                  </p:stCondLst>
+                                  <p:childTnLst>
+                                    <p:set>
+                                      <p:cBhvr>
+                                        <p:cTn id="14" dur="1" fill="hold">
+                                          <p:stCondLst>
+                                            <p:cond delay="0"/>
+                                          </p:stCondLst>
+                                        </p:cTn>
+                                        <p:tgtEl>
+                                          <p:spTgt spid="3">
+                                            <p:txEl>
+                                              <p:pRg st="3" end="3"/>
+                                            </p:txEl>
+                                          </p:spTgt>
+                                        </p:tgtEl>
+                                        <p:attrNameLst>
+                                          <p:attrName>style.visibility</p:attrName>
+                                        </p:attrNameLst>
+                                      </p:cBhvr>
+                                      <p:to>
+                                        <p:strVal val="visible"/>
+                                      </p:to>
+                                    </p:set>
+                                  </p:childTnLst>
+                                </p:cTn>
+                              </p:par>
+                            </p:childTnLst>
+                          </p:cTn>
+                        </p:par>
+                      </p:childTnLst>
+                    </p:cTn>
+                  </p:par>
+                  <p:par>
+                    <p:cTn id="15" fill="hold">
+                      <p:stCondLst>
+                        <p:cond delay="indefinite"/>
+                      </p:stCondLst>
+                      <p:childTnLst>
+                        <p:par>
+                          <p:cTn id="16" fill="hold">
+                            <p:stCondLst>
+                              <p:cond delay="0"/>
+                            </p:stCondLst>
+                            <p:childTnLst>
+                              <p:par>
+                                <p:cTn id="17" presetID="1" presetClass="entr" presetSubtype="0" fill="hold" nodeType="clickEffect">
+                                  <p:stCondLst>
+                                    <p:cond delay="0"/>
+                                  </p:stCondLst>
+                                  <p:childTnLst>
+                                    <p:set>
+                                      <p:cBhvr>
+                                        <p:cTn id="18" dur="1" fill="hold">
                                           <p:stCondLst>
                                             <p:cond delay="0"/>
                                           </p:stCondLst>

</xml_diff>

<commit_message>
Simplify even further; skip broader impact slide if required.
</commit_message>
<xml_diff>
--- a/nyu_wireless.pptx
+++ b/nyu_wireless.pptx
@@ -5,18 +5,17 @@
     <p:sldMasterId id="2147483648" r:id="rId1"/>
   </p:sldMasterIdLst>
   <p:notesMasterIdLst>
-    <p:notesMasterId r:id="rId11"/>
+    <p:notesMasterId r:id="rId10"/>
   </p:notesMasterIdLst>
   <p:sldIdLst>
     <p:sldId id="256" r:id="rId2"/>
     <p:sldId id="315" r:id="rId3"/>
     <p:sldId id="316" r:id="rId4"/>
     <p:sldId id="529" r:id="rId5"/>
-    <p:sldId id="319" r:id="rId6"/>
-    <p:sldId id="527" r:id="rId7"/>
-    <p:sldId id="358" r:id="rId8"/>
-    <p:sldId id="635" r:id="rId9"/>
-    <p:sldId id="638" r:id="rId10"/>
+    <p:sldId id="527" r:id="rId6"/>
+    <p:sldId id="358" r:id="rId7"/>
+    <p:sldId id="635" r:id="rId8"/>
+    <p:sldId id="638" r:id="rId9"/>
   </p:sldIdLst>
   <p:sldSz cx="12192000" cy="6858000"/>
   <p:notesSz cx="6858000" cy="9144000"/>
@@ -146,1451 +145,6 @@
     </p:ext>
   </p:extLst>
 </p:presentation>
-</file>
-
-<file path=ppt/charts/chart1.xml><?xml version="1.0" encoding="utf-8"?>
-<c:chartSpace xmlns:c="http://schemas.openxmlformats.org/drawingml/2006/chart" xmlns:a="http://schemas.openxmlformats.org/drawingml/2006/main" xmlns:r="http://schemas.openxmlformats.org/officeDocument/2006/relationships" xmlns:c16r2="http://schemas.microsoft.com/office/drawing/2015/06/chart">
-  <c:date1904 val="0"/>
-  <c:lang val="en-US"/>
-  <c:roundedCorners val="0"/>
-  <mc:AlternateContent xmlns:mc="http://schemas.openxmlformats.org/markup-compatibility/2006">
-    <mc:Choice xmlns:c14="http://schemas.microsoft.com/office/drawing/2007/8/2/chart" Requires="c14">
-      <c14:style val="102"/>
-    </mc:Choice>
-    <mc:Fallback>
-      <c:style val="2"/>
-    </mc:Fallback>
-  </mc:AlternateContent>
-  <c:clrMapOvr bg1="lt1" tx1="dk1" bg2="lt2" tx2="dk2" accent1="accent1" accent2="accent2" accent3="accent3" accent4="accent4" accent5="accent5" accent6="accent6" hlink="hlink" folHlink="folHlink"/>
-  <c:chart>
-    <c:title>
-      <c:tx>
-        <c:rich>
-          <a:bodyPr/>
-          <a:lstStyle/>
-          <a:p>
-            <a:pPr>
-              <a:defRPr/>
-            </a:pPr>
-            <a:r>
-              <a:rPr lang="en-US" baseline="0" dirty="0">
-                <a:latin typeface="Gadugi" charset="0"/>
-                <a:ea typeface="Gadugi" charset="0"/>
-                <a:cs typeface="Gadugi" charset="0"/>
-              </a:rPr>
-              <a:t> </a:t>
-            </a:r>
-            <a:r>
-              <a:rPr lang="en-US" baseline="0">
-                <a:latin typeface="Gadugi" charset="0"/>
-                <a:ea typeface="Gadugi" charset="0"/>
-                <a:cs typeface="Gadugi" charset="0"/>
-              </a:rPr>
-              <a:t>Aggregate Capacity</a:t>
-            </a:r>
-            <a:endParaRPr lang="en-US" dirty="0">
-              <a:latin typeface="Gadugi" charset="0"/>
-              <a:ea typeface="Gadugi" charset="0"/>
-              <a:cs typeface="Gadugi" charset="0"/>
-            </a:endParaRPr>
-          </a:p>
-        </c:rich>
-      </c:tx>
-      <c:layout>
-        <c:manualLayout>
-          <c:xMode val="edge"/>
-          <c:yMode val="edge"/>
-          <c:x val="0.392367491166078"/>
-          <c:y val="1.9816976002999601E-2"/>
-        </c:manualLayout>
-      </c:layout>
-      <c:overlay val="0"/>
-    </c:title>
-    <c:autoTitleDeleted val="0"/>
-    <c:plotArea>
-      <c:layout>
-        <c:manualLayout>
-          <c:layoutTarget val="inner"/>
-          <c:xMode val="edge"/>
-          <c:yMode val="edge"/>
-          <c:x val="0.118758520909268"/>
-          <c:y val="4.3326504918592502E-2"/>
-          <c:w val="0.83177151442642105"/>
-          <c:h val="0.76181806542474895"/>
-        </c:manualLayout>
-      </c:layout>
-      <c:lineChart>
-        <c:grouping val="standard"/>
-        <c:varyColors val="0"/>
-        <c:ser>
-          <c:idx val="2"/>
-          <c:order val="0"/>
-          <c:tx>
-            <c:strRef>
-              <c:f>Sheet1!$C$1</c:f>
-              <c:strCache>
-                <c:ptCount val="1"/>
-                <c:pt idx="0">
-                  <c:v>Fastest router</c:v>
-                </c:pt>
-              </c:strCache>
-            </c:strRef>
-          </c:tx>
-          <c:spPr>
-            <a:ln w="63500" cap="rnd">
-              <a:solidFill>
-                <a:srgbClr val="99162D"/>
-              </a:solidFill>
-              <a:prstDash val="sysDot"/>
-              <a:round/>
-            </a:ln>
-            <a:effectLst/>
-          </c:spPr>
-          <c:marker>
-            <c:symbol val="diamond"/>
-            <c:size val="15"/>
-            <c:spPr>
-              <a:solidFill>
-                <a:srgbClr val="FF6666"/>
-              </a:solidFill>
-              <a:ln w="9525">
-                <a:solidFill>
-                  <a:schemeClr val="tx1"/>
-                </a:solidFill>
-              </a:ln>
-              <a:effectLst/>
-            </c:spPr>
-          </c:marker>
-          <c:dLbls>
-            <c:dLbl>
-              <c:idx val="0"/>
-              <c:delete val="1"/>
-              <c:extLst>
-                <c:ext xmlns:c15="http://schemas.microsoft.com/office/drawing/2012/chart" uri="{CE6537A1-D6FC-4f65-9D91-7224C49458BB}"/>
-                <c:ext xmlns:c16="http://schemas.microsoft.com/office/drawing/2014/chart" uri="{C3380CC4-5D6E-409C-BE32-E72D297353CC}">
-                  <c16:uniqueId val="{00000000-1C57-B344-9675-175E7885B153}"/>
-                </c:ext>
-              </c:extLst>
-            </c:dLbl>
-            <c:dLbl>
-              <c:idx val="1"/>
-              <c:delete val="1"/>
-              <c:extLst>
-                <c:ext xmlns:c15="http://schemas.microsoft.com/office/drawing/2012/chart" uri="{CE6537A1-D6FC-4f65-9D91-7224C49458BB}"/>
-                <c:ext xmlns:c16="http://schemas.microsoft.com/office/drawing/2014/chart" uri="{C3380CC4-5D6E-409C-BE32-E72D297353CC}">
-                  <c16:uniqueId val="{00000001-1C57-B344-9675-175E7885B153}"/>
-                </c:ext>
-              </c:extLst>
-            </c:dLbl>
-            <c:dLbl>
-              <c:idx val="2"/>
-              <c:delete val="1"/>
-              <c:extLst>
-                <c:ext xmlns:c15="http://schemas.microsoft.com/office/drawing/2012/chart" uri="{CE6537A1-D6FC-4f65-9D91-7224C49458BB}"/>
-                <c:ext xmlns:c16="http://schemas.microsoft.com/office/drawing/2014/chart" uri="{C3380CC4-5D6E-409C-BE32-E72D297353CC}">
-                  <c16:uniqueId val="{00000002-1C57-B344-9675-175E7885B153}"/>
-                </c:ext>
-              </c:extLst>
-            </c:dLbl>
-            <c:dLbl>
-              <c:idx val="3"/>
-              <c:delete val="1"/>
-              <c:extLst>
-                <c:ext xmlns:c15="http://schemas.microsoft.com/office/drawing/2012/chart" uri="{CE6537A1-D6FC-4f65-9D91-7224C49458BB}"/>
-                <c:ext xmlns:c16="http://schemas.microsoft.com/office/drawing/2014/chart" uri="{C3380CC4-5D6E-409C-BE32-E72D297353CC}">
-                  <c16:uniqueId val="{00000003-1C57-B344-9675-175E7885B153}"/>
-                </c:ext>
-              </c:extLst>
-            </c:dLbl>
-            <c:dLbl>
-              <c:idx val="4"/>
-              <c:tx>
-                <c:rich>
-                  <a:bodyPr/>
-                  <a:lstStyle/>
-                  <a:p>
-                    <a:r>
-                      <a:rPr lang="en-US" sz="1800" baseline="0" dirty="0">
-                        <a:solidFill>
-                          <a:schemeClr val="tx1"/>
-                        </a:solidFill>
-                      </a:rPr>
-                      <a:t>Catalyst</a:t>
-                    </a:r>
-                    <a:endParaRPr lang="en-US" baseline="0" dirty="0">
-                      <a:solidFill>
-                        <a:schemeClr val="tx1"/>
-                      </a:solidFill>
-                    </a:endParaRPr>
-                  </a:p>
-                </c:rich>
-              </c:tx>
-              <c:dLblPos val="t"/>
-              <c:showLegendKey val="0"/>
-              <c:showVal val="1"/>
-              <c:showCatName val="0"/>
-              <c:showSerName val="0"/>
-              <c:showPercent val="0"/>
-              <c:showBubbleSize val="0"/>
-              <c:extLst>
-                <c:ext xmlns:c15="http://schemas.microsoft.com/office/drawing/2012/chart" uri="{CE6537A1-D6FC-4f65-9D91-7224C49458BB}"/>
-                <c:ext xmlns:c16="http://schemas.microsoft.com/office/drawing/2014/chart" uri="{C3380CC4-5D6E-409C-BE32-E72D297353CC}">
-                  <c16:uniqueId val="{00000004-1C57-B344-9675-175E7885B153}"/>
-                </c:ext>
-              </c:extLst>
-            </c:dLbl>
-            <c:dLbl>
-              <c:idx val="7"/>
-              <c:layout>
-                <c:manualLayout>
-                  <c:x val="-0.123236116866971"/>
-                  <c:y val="-6.1520422605671102E-2"/>
-                </c:manualLayout>
-              </c:layout>
-              <c:tx>
-                <c:rich>
-                  <a:bodyPr/>
-                  <a:lstStyle/>
-                  <a:p>
-                    <a:r>
-                      <a:rPr lang="en-US" sz="1800" baseline="0" dirty="0">
-                        <a:solidFill>
-                          <a:schemeClr val="tx1"/>
-                        </a:solidFill>
-                      </a:rPr>
-                      <a:t>Broadcom</a:t>
-                    </a:r>
-                  </a:p>
-                  <a:p>
-                    <a:r>
-                      <a:rPr lang="en-US" sz="1800" baseline="0" dirty="0">
-                        <a:solidFill>
-                          <a:schemeClr val="tx1"/>
-                        </a:solidFill>
-                      </a:rPr>
-                      <a:t>5670</a:t>
-                    </a:r>
-                    <a:endParaRPr lang="en-US" baseline="0" dirty="0">
-                      <a:solidFill>
-                        <a:schemeClr val="tx1"/>
-                      </a:solidFill>
-                    </a:endParaRPr>
-                  </a:p>
-                </c:rich>
-              </c:tx>
-              <c:dLblPos val="r"/>
-              <c:showLegendKey val="0"/>
-              <c:showVal val="1"/>
-              <c:showCatName val="0"/>
-              <c:showSerName val="0"/>
-              <c:showPercent val="0"/>
-              <c:showBubbleSize val="0"/>
-              <c:extLst>
-                <c:ext xmlns:c15="http://schemas.microsoft.com/office/drawing/2012/chart" uri="{CE6537A1-D6FC-4f65-9D91-7224C49458BB}"/>
-                <c:ext xmlns:c16="http://schemas.microsoft.com/office/drawing/2014/chart" uri="{C3380CC4-5D6E-409C-BE32-E72D297353CC}">
-                  <c16:uniqueId val="{00000005-1C57-B344-9675-175E7885B153}"/>
-                </c:ext>
-              </c:extLst>
-            </c:dLbl>
-            <c:dLbl>
-              <c:idx val="8"/>
-              <c:tx>
-                <c:rich>
-                  <a:bodyPr/>
-                  <a:lstStyle/>
-                  <a:p>
-                    <a:r>
-                      <a:rPr lang="en-US" sz="1800" baseline="0">
-                        <a:solidFill>
-                          <a:schemeClr val="tx1"/>
-                        </a:solidFill>
-                      </a:rPr>
-                      <a:t>Scorpion</a:t>
-                    </a:r>
-                    <a:endParaRPr lang="en-US" baseline="0" dirty="0">
-                      <a:solidFill>
-                        <a:schemeClr val="tx1"/>
-                      </a:solidFill>
-                    </a:endParaRPr>
-                  </a:p>
-                </c:rich>
-              </c:tx>
-              <c:dLblPos val="t"/>
-              <c:showLegendKey val="0"/>
-              <c:showVal val="1"/>
-              <c:showCatName val="0"/>
-              <c:showSerName val="0"/>
-              <c:showPercent val="0"/>
-              <c:showBubbleSize val="0"/>
-              <c:extLst>
-                <c:ext xmlns:c15="http://schemas.microsoft.com/office/drawing/2012/chart" uri="{CE6537A1-D6FC-4f65-9D91-7224C49458BB}"/>
-                <c:ext xmlns:c16="http://schemas.microsoft.com/office/drawing/2014/chart" uri="{C3380CC4-5D6E-409C-BE32-E72D297353CC}">
-                  <c16:uniqueId val="{00000006-1C57-B344-9675-175E7885B153}"/>
-                </c:ext>
-              </c:extLst>
-            </c:dLbl>
-            <c:dLbl>
-              <c:idx val="10"/>
-              <c:tx>
-                <c:rich>
-                  <a:bodyPr/>
-                  <a:lstStyle/>
-                  <a:p>
-                    <a:r>
-                      <a:rPr lang="en-US" sz="1800" baseline="0">
-                        <a:solidFill>
-                          <a:schemeClr val="tx1"/>
-                        </a:solidFill>
-                      </a:rPr>
-                      <a:t>Trident</a:t>
-                    </a:r>
-                    <a:endParaRPr lang="en-US" baseline="0" dirty="0">
-                      <a:solidFill>
-                        <a:schemeClr val="tx1"/>
-                      </a:solidFill>
-                    </a:endParaRPr>
-                  </a:p>
-                </c:rich>
-              </c:tx>
-              <c:dLblPos val="t"/>
-              <c:showLegendKey val="0"/>
-              <c:showVal val="1"/>
-              <c:showCatName val="0"/>
-              <c:showSerName val="0"/>
-              <c:showPercent val="0"/>
-              <c:showBubbleSize val="0"/>
-              <c:extLst>
-                <c:ext xmlns:c15="http://schemas.microsoft.com/office/drawing/2012/chart" uri="{CE6537A1-D6FC-4f65-9D91-7224C49458BB}"/>
-                <c:ext xmlns:c16="http://schemas.microsoft.com/office/drawing/2014/chart" uri="{C3380CC4-5D6E-409C-BE32-E72D297353CC}">
-                  <c16:uniqueId val="{00000007-1C57-B344-9675-175E7885B153}"/>
-                </c:ext>
-              </c:extLst>
-            </c:dLbl>
-            <c:dLbl>
-              <c:idx val="11"/>
-              <c:tx>
-                <c:rich>
-                  <a:bodyPr/>
-                  <a:lstStyle/>
-                  <a:p>
-                    <a:r>
-                      <a:rPr lang="en-US"/>
-                      <a:t>TridentII</a:t>
-                    </a:r>
-                  </a:p>
-                </c:rich>
-              </c:tx>
-              <c:dLblPos val="t"/>
-              <c:showLegendKey val="0"/>
-              <c:showVal val="1"/>
-              <c:showCatName val="0"/>
-              <c:showSerName val="0"/>
-              <c:showPercent val="0"/>
-              <c:showBubbleSize val="0"/>
-              <c:extLst>
-                <c:ext xmlns:c15="http://schemas.microsoft.com/office/drawing/2012/chart" uri="{CE6537A1-D6FC-4f65-9D91-7224C49458BB}"/>
-                <c:ext xmlns:c16="http://schemas.microsoft.com/office/drawing/2014/chart" uri="{C3380CC4-5D6E-409C-BE32-E72D297353CC}">
-                  <c16:uniqueId val="{00000008-1C57-B344-9675-175E7885B153}"/>
-                </c:ext>
-              </c:extLst>
-            </c:dLbl>
-            <c:dLbl>
-              <c:idx val="12"/>
-              <c:layout>
-                <c:manualLayout>
-                  <c:x val="0"/>
-                  <c:y val="-5.6910569105690999E-2"/>
-                </c:manualLayout>
-              </c:layout>
-              <c:tx>
-                <c:rich>
-                  <a:bodyPr/>
-                  <a:lstStyle/>
-                  <a:p>
-                    <a:r>
-                      <a:rPr lang="en-US" sz="1800" baseline="0" dirty="0">
-                        <a:solidFill>
-                          <a:schemeClr val="tx1"/>
-                        </a:solidFill>
-                      </a:rPr>
-                      <a:t>Tomahawk</a:t>
-                    </a:r>
-                    <a:endParaRPr lang="en-US" baseline="0" dirty="0">
-                      <a:solidFill>
-                        <a:schemeClr val="tx1"/>
-                      </a:solidFill>
-                    </a:endParaRPr>
-                  </a:p>
-                </c:rich>
-              </c:tx>
-              <c:dLblPos val="r"/>
-              <c:showLegendKey val="0"/>
-              <c:showVal val="1"/>
-              <c:showCatName val="0"/>
-              <c:showSerName val="0"/>
-              <c:showPercent val="0"/>
-              <c:showBubbleSize val="0"/>
-              <c:extLst>
-                <c:ext xmlns:c15="http://schemas.microsoft.com/office/drawing/2012/chart" uri="{CE6537A1-D6FC-4f65-9D91-7224C49458BB}"/>
-                <c:ext xmlns:c16="http://schemas.microsoft.com/office/drawing/2014/chart" uri="{C3380CC4-5D6E-409C-BE32-E72D297353CC}">
-                  <c16:uniqueId val="{00000009-1C57-B344-9675-175E7885B153}"/>
-                </c:ext>
-              </c:extLst>
-            </c:dLbl>
-            <c:spPr>
-              <a:noFill/>
-              <a:ln>
-                <a:noFill/>
-              </a:ln>
-              <a:effectLst/>
-            </c:spPr>
-            <c:txPr>
-              <a:bodyPr rot="0" vert="horz"/>
-              <a:lstStyle/>
-              <a:p>
-                <a:pPr>
-                  <a:defRPr sz="1800" baseline="0">
-                    <a:solidFill>
-                      <a:schemeClr val="tx1"/>
-                    </a:solidFill>
-                  </a:defRPr>
-                </a:pPr>
-                <a:endParaRPr lang="en-US"/>
-              </a:p>
-            </c:txPr>
-            <c:dLblPos val="t"/>
-            <c:showLegendKey val="0"/>
-            <c:showVal val="1"/>
-            <c:showCatName val="0"/>
-            <c:showSerName val="0"/>
-            <c:showPercent val="0"/>
-            <c:showBubbleSize val="0"/>
-            <c:showLeaderLines val="0"/>
-            <c:extLst>
-              <c:ext xmlns:c15="http://schemas.microsoft.com/office/drawing/2012/chart" uri="{CE6537A1-D6FC-4f65-9D91-7224C49458BB}">
-                <c15:showLeaderLines val="1"/>
-                <c15:leaderLines>
-                  <c:spPr>
-                    <a:ln w="9525" cap="flat" cmpd="sng" algn="ctr">
-                      <a:solidFill>
-                        <a:schemeClr val="tx1">
-                          <a:lumMod val="35000"/>
-                          <a:lumOff val="65000"/>
-                        </a:schemeClr>
-                      </a:solidFill>
-                      <a:round/>
-                    </a:ln>
-                    <a:effectLst/>
-                  </c:spPr>
-                </c15:leaderLines>
-              </c:ext>
-            </c:extLst>
-          </c:dLbls>
-          <c:cat>
-            <c:numRef>
-              <c:f>Sheet1!$A$2:$A$14</c:f>
-              <c:numCache>
-                <c:formatCode>General</c:formatCode>
-                <c:ptCount val="13"/>
-                <c:pt idx="0">
-                  <c:v>1969</c:v>
-                </c:pt>
-                <c:pt idx="1">
-                  <c:v>1982</c:v>
-                </c:pt>
-                <c:pt idx="2">
-                  <c:v>1983</c:v>
-                </c:pt>
-                <c:pt idx="3">
-                  <c:v>1985</c:v>
-                </c:pt>
-                <c:pt idx="4">
-                  <c:v>1999</c:v>
-                </c:pt>
-                <c:pt idx="5">
-                  <c:v>2000</c:v>
-                </c:pt>
-                <c:pt idx="6">
-                  <c:v>2002</c:v>
-                </c:pt>
-                <c:pt idx="7">
-                  <c:v>2004</c:v>
-                </c:pt>
-                <c:pt idx="8">
-                  <c:v>2007</c:v>
-                </c:pt>
-                <c:pt idx="9">
-                  <c:v>2009</c:v>
-                </c:pt>
-                <c:pt idx="10">
-                  <c:v>2010</c:v>
-                </c:pt>
-                <c:pt idx="11">
-                  <c:v>2012</c:v>
-                </c:pt>
-                <c:pt idx="12">
-                  <c:v>2014</c:v>
-                </c:pt>
-              </c:numCache>
-            </c:numRef>
-          </c:cat>
-          <c:val>
-            <c:numRef>
-              <c:f>Sheet1!$C$2:$C$14</c:f>
-              <c:numCache>
-                <c:formatCode>General</c:formatCode>
-                <c:ptCount val="13"/>
-                <c:pt idx="0">
-                  <c:v>7.5000000000000002E-4</c:v>
-                </c:pt>
-                <c:pt idx="1">
-                  <c:v>5.0000000000000001E-4</c:v>
-                </c:pt>
-                <c:pt idx="2">
-                  <c:v>4.0000000000000002E-4</c:v>
-                </c:pt>
-                <c:pt idx="3">
-                  <c:v>0.08</c:v>
-                </c:pt>
-                <c:pt idx="4">
-                  <c:v>32</c:v>
-                </c:pt>
-                <c:pt idx="7">
-                  <c:v>80</c:v>
-                </c:pt>
-                <c:pt idx="8">
-                  <c:v>240</c:v>
-                </c:pt>
-                <c:pt idx="10">
-                  <c:v>640</c:v>
-                </c:pt>
-                <c:pt idx="11">
-                  <c:v>1280</c:v>
-                </c:pt>
-                <c:pt idx="12">
-                  <c:v>3200</c:v>
-                </c:pt>
-              </c:numCache>
-            </c:numRef>
-          </c:val>
-          <c:smooth val="0"/>
-          <c:extLst>
-            <c:ext xmlns:c16="http://schemas.microsoft.com/office/drawing/2014/chart" uri="{C3380CC4-5D6E-409C-BE32-E72D297353CC}">
-              <c16:uniqueId val="{0000000A-1C57-B344-9675-175E7885B153}"/>
-            </c:ext>
-          </c:extLst>
-        </c:ser>
-        <c:ser>
-          <c:idx val="0"/>
-          <c:order val="1"/>
-          <c:tx>
-            <c:strRef>
-              <c:f>Sheet1!$B$1</c:f>
-              <c:strCache>
-                <c:ptCount val="1"/>
-                <c:pt idx="0">
-                  <c:v>Software router</c:v>
-                </c:pt>
-              </c:strCache>
-            </c:strRef>
-          </c:tx>
-          <c:spPr>
-            <a:ln w="63500" cap="rnd">
-              <a:solidFill>
-                <a:srgbClr val="0000FF">
-                  <a:alpha val="70000"/>
-                </a:srgbClr>
-              </a:solidFill>
-              <a:prstDash val="solid"/>
-              <a:round/>
-            </a:ln>
-            <a:effectLst/>
-          </c:spPr>
-          <c:marker>
-            <c:symbol val="none"/>
-          </c:marker>
-          <c:dLbls>
-            <c:dLbl>
-              <c:idx val="0"/>
-              <c:layout>
-                <c:manualLayout>
-                  <c:x val="-3.3701436613709501E-2"/>
-                  <c:y val="-6.9071762371166995E-2"/>
-                </c:manualLayout>
-              </c:layout>
-              <c:tx>
-                <c:rich>
-                  <a:bodyPr/>
-                  <a:lstStyle/>
-                  <a:p>
-                    <a:r>
-                      <a:rPr lang="en-US" dirty="0"/>
-                      <a:t>IMP</a:t>
-                    </a:r>
-                  </a:p>
-                </c:rich>
-              </c:tx>
-              <c:dLblPos val="r"/>
-              <c:showLegendKey val="0"/>
-              <c:showVal val="1"/>
-              <c:showCatName val="0"/>
-              <c:showSerName val="0"/>
-              <c:showPercent val="0"/>
-              <c:showBubbleSize val="0"/>
-              <c:extLst>
-                <c:ext xmlns:c15="http://schemas.microsoft.com/office/drawing/2012/chart" uri="{CE6537A1-D6FC-4f65-9D91-7224C49458BB}"/>
-                <c:ext xmlns:c16="http://schemas.microsoft.com/office/drawing/2014/chart" uri="{C3380CC4-5D6E-409C-BE32-E72D297353CC}">
-                  <c16:uniqueId val="{0000000B-1C57-B344-9675-175E7885B153}"/>
-                </c:ext>
-              </c:extLst>
-            </c:dLbl>
-            <c:dLbl>
-              <c:idx val="1"/>
-              <c:layout>
-                <c:manualLayout>
-                  <c:x val="-4.9187279151943403E-2"/>
-                  <c:y val="-7.1781789471437998E-2"/>
-                </c:manualLayout>
-              </c:layout>
-              <c:tx>
-                <c:rich>
-                  <a:bodyPr/>
-                  <a:lstStyle/>
-                  <a:p>
-                    <a:r>
-                      <a:rPr lang="en-US" dirty="0"/>
-                      <a:t>MIT</a:t>
-                    </a:r>
-                    <a:r>
-                      <a:rPr lang="en-US" baseline="0" dirty="0"/>
-                      <a:t> CGW</a:t>
-                    </a:r>
-                    <a:endParaRPr lang="en-US" dirty="0"/>
-                  </a:p>
-                </c:rich>
-              </c:tx>
-              <c:dLblPos val="r"/>
-              <c:showLegendKey val="0"/>
-              <c:showVal val="1"/>
-              <c:showCatName val="0"/>
-              <c:showSerName val="0"/>
-              <c:showPercent val="0"/>
-              <c:showBubbleSize val="0"/>
-              <c:extLst>
-                <c:ext xmlns:c15="http://schemas.microsoft.com/office/drawing/2012/chart" uri="{CE6537A1-D6FC-4f65-9D91-7224C49458BB}"/>
-                <c:ext xmlns:c16="http://schemas.microsoft.com/office/drawing/2014/chart" uri="{C3380CC4-5D6E-409C-BE32-E72D297353CC}">
-                  <c16:uniqueId val="{0000000C-1C57-B344-9675-175E7885B153}"/>
-                </c:ext>
-              </c:extLst>
-            </c:dLbl>
-            <c:dLbl>
-              <c:idx val="2"/>
-              <c:layout>
-                <c:manualLayout>
-                  <c:x val="3.3686690223792299E-3"/>
-                  <c:y val="-3.9261464268186101E-2"/>
-                </c:manualLayout>
-              </c:layout>
-              <c:tx>
-                <c:rich>
-                  <a:bodyPr/>
-                  <a:lstStyle/>
-                  <a:p>
-                    <a:r>
-                      <a:rPr lang="en-US"/>
-                      <a:t>Fuzzball</a:t>
-                    </a:r>
-                  </a:p>
-                </c:rich>
-              </c:tx>
-              <c:dLblPos val="r"/>
-              <c:showLegendKey val="0"/>
-              <c:showVal val="1"/>
-              <c:showCatName val="0"/>
-              <c:showSerName val="0"/>
-              <c:showPercent val="0"/>
-              <c:showBubbleSize val="0"/>
-              <c:extLst>
-                <c:ext xmlns:c15="http://schemas.microsoft.com/office/drawing/2012/chart" uri="{CE6537A1-D6FC-4f65-9D91-7224C49458BB}"/>
-                <c:ext xmlns:c16="http://schemas.microsoft.com/office/drawing/2014/chart" uri="{C3380CC4-5D6E-409C-BE32-E72D297353CC}">
-                  <c16:uniqueId val="{0000000D-1C57-B344-9675-175E7885B153}"/>
-                </c:ext>
-              </c:extLst>
-            </c:dLbl>
-            <c:dLbl>
-              <c:idx val="3"/>
-              <c:layout>
-                <c:manualLayout>
-                  <c:x val="-9.8071283492390304E-2"/>
-                  <c:y val="-1.4871220365747E-2"/>
-                </c:manualLayout>
-              </c:layout>
-              <c:tx>
-                <c:rich>
-                  <a:bodyPr/>
-                  <a:lstStyle/>
-                  <a:p>
-                    <a:r>
-                      <a:rPr lang="en-US"/>
-                      <a:t>Proteon</a:t>
-                    </a:r>
-                    <a:endParaRPr lang="en-US" dirty="0"/>
-                  </a:p>
-                </c:rich>
-              </c:tx>
-              <c:dLblPos val="r"/>
-              <c:showLegendKey val="0"/>
-              <c:showVal val="1"/>
-              <c:showCatName val="0"/>
-              <c:showSerName val="0"/>
-              <c:showPercent val="0"/>
-              <c:showBubbleSize val="0"/>
-              <c:extLst>
-                <c:ext xmlns:c15="http://schemas.microsoft.com/office/drawing/2012/chart" uri="{CE6537A1-D6FC-4f65-9D91-7224C49458BB}"/>
-                <c:ext xmlns:c16="http://schemas.microsoft.com/office/drawing/2014/chart" uri="{C3380CC4-5D6E-409C-BE32-E72D297353CC}">
-                  <c16:uniqueId val="{0000000E-1C57-B344-9675-175E7885B153}"/>
-                </c:ext>
-              </c:extLst>
-            </c:dLbl>
-            <c:dLbl>
-              <c:idx val="4"/>
-              <c:layout>
-                <c:manualLayout>
-                  <c:x val="-7.4123146267494E-2"/>
-                  <c:y val="8.1532979109318601E-2"/>
-                </c:manualLayout>
-              </c:layout>
-              <c:tx>
-                <c:rich>
-                  <a:bodyPr/>
-                  <a:lstStyle/>
-                  <a:p>
-                    <a:r>
-                      <a:rPr lang="en-US" sz="1800" baseline="0" dirty="0">
-                        <a:solidFill>
-                          <a:schemeClr val="tx1"/>
-                        </a:solidFill>
-                      </a:rPr>
-                      <a:t>SNAP</a:t>
-                    </a:r>
-                  </a:p>
-                  <a:p>
-                    <a:r>
-                      <a:rPr lang="en-US" sz="1800" baseline="0" dirty="0">
-                        <a:solidFill>
-                          <a:schemeClr val="tx1"/>
-                        </a:solidFill>
-                      </a:rPr>
-                      <a:t>(Active Networks)</a:t>
-                    </a:r>
-                  </a:p>
-                </c:rich>
-              </c:tx>
-              <c:dLblPos val="r"/>
-              <c:showLegendKey val="0"/>
-              <c:showVal val="1"/>
-              <c:showCatName val="0"/>
-              <c:showSerName val="0"/>
-              <c:showPercent val="0"/>
-              <c:showBubbleSize val="0"/>
-              <c:extLst>
-                <c:ext xmlns:c15="http://schemas.microsoft.com/office/drawing/2012/chart" uri="{CE6537A1-D6FC-4f65-9D91-7224C49458BB}"/>
-                <c:ext xmlns:c16="http://schemas.microsoft.com/office/drawing/2014/chart" uri="{C3380CC4-5D6E-409C-BE32-E72D297353CC}">
-                  <c16:uniqueId val="{0000000F-1C57-B344-9675-175E7885B153}"/>
-                </c:ext>
-              </c:extLst>
-            </c:dLbl>
-            <c:dLbl>
-              <c:idx val="5"/>
-              <c:layout>
-                <c:manualLayout>
-                  <c:x val="-1.43427654582046E-2"/>
-                  <c:y val="4.3883447495892298E-2"/>
-                </c:manualLayout>
-              </c:layout>
-              <c:tx>
-                <c:rich>
-                  <a:bodyPr/>
-                  <a:lstStyle/>
-                  <a:p>
-                    <a:r>
-                      <a:rPr lang="en-US" sz="1800" baseline="0">
-                        <a:solidFill>
-                          <a:schemeClr val="tx1"/>
-                        </a:solidFill>
-                      </a:rPr>
-                      <a:t>Click</a:t>
-                    </a:r>
-                  </a:p>
-                  <a:p>
-                    <a:r>
-                      <a:rPr lang="en-US" sz="1800" baseline="0">
-                        <a:solidFill>
-                          <a:schemeClr val="tx1"/>
-                        </a:solidFill>
-                      </a:rPr>
-                      <a:t>(CPU)</a:t>
-                    </a:r>
-                    <a:endParaRPr lang="en-US" baseline="0" dirty="0">
-                      <a:solidFill>
-                        <a:schemeClr val="tx1"/>
-                      </a:solidFill>
-                    </a:endParaRPr>
-                  </a:p>
-                </c:rich>
-              </c:tx>
-              <c:dLblPos val="r"/>
-              <c:showLegendKey val="0"/>
-              <c:showVal val="1"/>
-              <c:showCatName val="0"/>
-              <c:showSerName val="0"/>
-              <c:showPercent val="0"/>
-              <c:showBubbleSize val="0"/>
-              <c:extLst>
-                <c:ext xmlns:c15="http://schemas.microsoft.com/office/drawing/2012/chart" uri="{CE6537A1-D6FC-4f65-9D91-7224C49458BB}"/>
-                <c:ext xmlns:c16="http://schemas.microsoft.com/office/drawing/2014/chart" uri="{C3380CC4-5D6E-409C-BE32-E72D297353CC}">
-                  <c16:uniqueId val="{00000010-1C57-B344-9675-175E7885B153}"/>
-                </c:ext>
-              </c:extLst>
-            </c:dLbl>
-            <c:dLbl>
-              <c:idx val="6"/>
-              <c:layout>
-                <c:manualLayout>
-                  <c:x val="-2.33544711071592E-2"/>
-                  <c:y val="7.3984546878179402E-2"/>
-                </c:manualLayout>
-              </c:layout>
-              <c:tx>
-                <c:rich>
-                  <a:bodyPr/>
-                  <a:lstStyle/>
-                  <a:p>
-                    <a:r>
-                      <a:rPr lang="en-US" sz="1800" baseline="0">
-                        <a:solidFill>
-                          <a:schemeClr val="tx1"/>
-                        </a:solidFill>
-                      </a:rPr>
-                      <a:t>IXP 2400</a:t>
-                    </a:r>
-                  </a:p>
-                  <a:p>
-                    <a:r>
-                      <a:rPr lang="en-US" sz="1800" baseline="0">
-                        <a:solidFill>
-                          <a:schemeClr val="tx1"/>
-                        </a:solidFill>
-                      </a:rPr>
-                      <a:t>(NPU)</a:t>
-                    </a:r>
-                    <a:endParaRPr lang="en-US" baseline="0">
-                      <a:solidFill>
-                        <a:schemeClr val="tx1"/>
-                      </a:solidFill>
-                    </a:endParaRPr>
-                  </a:p>
-                </c:rich>
-              </c:tx>
-              <c:dLblPos val="r"/>
-              <c:showLegendKey val="0"/>
-              <c:showVal val="1"/>
-              <c:showCatName val="0"/>
-              <c:showSerName val="0"/>
-              <c:showPercent val="0"/>
-              <c:showBubbleSize val="0"/>
-              <c:extLst>
-                <c:ext xmlns:c15="http://schemas.microsoft.com/office/drawing/2012/chart" uri="{CE6537A1-D6FC-4f65-9D91-7224C49458BB}"/>
-                <c:ext xmlns:c16="http://schemas.microsoft.com/office/drawing/2014/chart" uri="{C3380CC4-5D6E-409C-BE32-E72D297353CC}">
-                  <c16:uniqueId val="{00000011-1C57-B344-9675-175E7885B153}"/>
-                </c:ext>
-              </c:extLst>
-            </c:dLbl>
-            <c:dLbl>
-              <c:idx val="9"/>
-              <c:layout>
-                <c:manualLayout>
-                  <c:x val="-9.4975376311176599E-2"/>
-                  <c:y val="9.4205236540554405E-2"/>
-                </c:manualLayout>
-              </c:layout>
-              <c:tx>
-                <c:rich>
-                  <a:bodyPr/>
-                  <a:lstStyle/>
-                  <a:p>
-                    <a:r>
-                      <a:rPr lang="en-US" sz="1800" baseline="0">
-                        <a:solidFill>
-                          <a:schemeClr val="tx1"/>
-                        </a:solidFill>
-                      </a:rPr>
-                      <a:t>RouteBricks</a:t>
-                    </a:r>
-                  </a:p>
-                  <a:p>
-                    <a:r>
-                      <a:rPr lang="en-US" sz="1800" baseline="0">
-                        <a:solidFill>
-                          <a:schemeClr val="tx1"/>
-                        </a:solidFill>
-                      </a:rPr>
-                      <a:t>(multi-core)</a:t>
-                    </a:r>
-                    <a:endParaRPr lang="en-US" baseline="0" dirty="0">
-                      <a:solidFill>
-                        <a:schemeClr val="tx1"/>
-                      </a:solidFill>
-                    </a:endParaRPr>
-                  </a:p>
-                </c:rich>
-              </c:tx>
-              <c:dLblPos val="r"/>
-              <c:showLegendKey val="0"/>
-              <c:showVal val="1"/>
-              <c:showCatName val="0"/>
-              <c:showSerName val="0"/>
-              <c:showPercent val="0"/>
-              <c:showBubbleSize val="0"/>
-              <c:extLst>
-                <c:ext xmlns:c15="http://schemas.microsoft.com/office/drawing/2012/chart" uri="{CE6537A1-D6FC-4f65-9D91-7224C49458BB}"/>
-                <c:ext xmlns:c16="http://schemas.microsoft.com/office/drawing/2014/chart" uri="{C3380CC4-5D6E-409C-BE32-E72D297353CC}">
-                  <c16:uniqueId val="{00000012-1C57-B344-9675-175E7885B153}"/>
-                </c:ext>
-              </c:extLst>
-            </c:dLbl>
-            <c:dLbl>
-              <c:idx val="10"/>
-              <c:layout>
-                <c:manualLayout>
-                  <c:x val="-5.3422924607922299E-2"/>
-                  <c:y val="7.72289439429827E-2"/>
-                </c:manualLayout>
-              </c:layout>
-              <c:tx>
-                <c:rich>
-                  <a:bodyPr/>
-                  <a:lstStyle/>
-                  <a:p>
-                    <a:r>
-                      <a:rPr lang="en-US" sz="1800" baseline="0">
-                        <a:solidFill>
-                          <a:schemeClr val="tx1"/>
-                        </a:solidFill>
-                      </a:rPr>
-                      <a:t>PacketShader </a:t>
-                    </a:r>
-                  </a:p>
-                  <a:p>
-                    <a:r>
-                      <a:rPr lang="en-US" sz="1800" baseline="0">
-                        <a:solidFill>
-                          <a:schemeClr val="tx1"/>
-                        </a:solidFill>
-                      </a:rPr>
-                      <a:t>(GPU)</a:t>
-                    </a:r>
-                    <a:endParaRPr lang="en-US" baseline="0">
-                      <a:solidFill>
-                        <a:schemeClr val="tx1"/>
-                      </a:solidFill>
-                    </a:endParaRPr>
-                  </a:p>
-                </c:rich>
-              </c:tx>
-              <c:dLblPos val="r"/>
-              <c:showLegendKey val="0"/>
-              <c:showVal val="1"/>
-              <c:showCatName val="0"/>
-              <c:showSerName val="0"/>
-              <c:showPercent val="0"/>
-              <c:showBubbleSize val="0"/>
-              <c:extLst>
-                <c:ext xmlns:c15="http://schemas.microsoft.com/office/drawing/2012/chart" uri="{CE6537A1-D6FC-4f65-9D91-7224C49458BB}">
-                  <c15:layout>
-                    <c:manualLayout>
-                      <c:w val="0.136903303093452"/>
-                      <c:h val="0.14436901015419901"/>
-                    </c:manualLayout>
-                  </c15:layout>
-                </c:ext>
-                <c:ext xmlns:c16="http://schemas.microsoft.com/office/drawing/2014/chart" uri="{C3380CC4-5D6E-409C-BE32-E72D297353CC}">
-                  <c16:uniqueId val="{00000013-1C57-B344-9675-175E7885B153}"/>
-                </c:ext>
-              </c:extLst>
-            </c:dLbl>
-            <c:dLbl>
-              <c:idx val="12"/>
-              <c:layout>
-                <c:manualLayout>
-                  <c:x val="0"/>
-                  <c:y val="7.0350809807310705E-2"/>
-                </c:manualLayout>
-              </c:layout>
-              <c:tx>
-                <c:rich>
-                  <a:bodyPr/>
-                  <a:lstStyle/>
-                  <a:p>
-                    <a:r>
-                      <a:rPr lang="en-US" sz="1800" baseline="0" dirty="0" err="1">
-                        <a:solidFill>
-                          <a:schemeClr val="tx1"/>
-                        </a:solidFill>
-                      </a:rPr>
-                      <a:t>NetFPGA</a:t>
-                    </a:r>
-                    <a:r>
-                      <a:rPr lang="en-US" sz="1800" baseline="0" dirty="0">
-                        <a:solidFill>
-                          <a:schemeClr val="tx1"/>
-                        </a:solidFill>
-                      </a:rPr>
-                      <a:t>-SUME</a:t>
-                    </a:r>
-                  </a:p>
-                  <a:p>
-                    <a:r>
-                      <a:rPr lang="en-US" sz="1800" baseline="0" dirty="0">
-                        <a:solidFill>
-                          <a:schemeClr val="tx1"/>
-                        </a:solidFill>
-                      </a:rPr>
-                      <a:t>(FPGA)</a:t>
-                    </a:r>
-                  </a:p>
-                </c:rich>
-              </c:tx>
-              <c:dLblPos val="r"/>
-              <c:showLegendKey val="0"/>
-              <c:showVal val="1"/>
-              <c:showCatName val="0"/>
-              <c:showSerName val="0"/>
-              <c:showPercent val="0"/>
-              <c:showBubbleSize val="0"/>
-              <c:extLst>
-                <c:ext xmlns:c15="http://schemas.microsoft.com/office/drawing/2012/chart" uri="{CE6537A1-D6FC-4f65-9D91-7224C49458BB}"/>
-                <c:ext xmlns:c16="http://schemas.microsoft.com/office/drawing/2014/chart" uri="{C3380CC4-5D6E-409C-BE32-E72D297353CC}">
-                  <c16:uniqueId val="{00000014-1C57-B344-9675-175E7885B153}"/>
-                </c:ext>
-              </c:extLst>
-            </c:dLbl>
-            <c:spPr>
-              <a:noFill/>
-              <a:ln>
-                <a:noFill/>
-              </a:ln>
-              <a:effectLst/>
-            </c:spPr>
-            <c:txPr>
-              <a:bodyPr rot="0" vert="horz"/>
-              <a:lstStyle/>
-              <a:p>
-                <a:pPr>
-                  <a:defRPr sz="1800" baseline="0">
-                    <a:solidFill>
-                      <a:schemeClr val="tx1"/>
-                    </a:solidFill>
-                  </a:defRPr>
-                </a:pPr>
-                <a:endParaRPr lang="en-US"/>
-              </a:p>
-            </c:txPr>
-            <c:dLblPos val="t"/>
-            <c:showLegendKey val="0"/>
-            <c:showVal val="1"/>
-            <c:showCatName val="0"/>
-            <c:showSerName val="0"/>
-            <c:showPercent val="0"/>
-            <c:showBubbleSize val="0"/>
-            <c:showLeaderLines val="0"/>
-            <c:extLst>
-              <c:ext xmlns:c15="http://schemas.microsoft.com/office/drawing/2012/chart" uri="{CE6537A1-D6FC-4f65-9D91-7224C49458BB}">
-                <c15:showLeaderLines val="1"/>
-                <c15:leaderLines>
-                  <c:spPr>
-                    <a:ln w="9525" cap="flat" cmpd="sng" algn="ctr">
-                      <a:solidFill>
-                        <a:schemeClr val="tx1">
-                          <a:lumMod val="35000"/>
-                          <a:lumOff val="65000"/>
-                        </a:schemeClr>
-                      </a:solidFill>
-                      <a:round/>
-                    </a:ln>
-                    <a:effectLst/>
-                  </c:spPr>
-                </c15:leaderLines>
-              </c:ext>
-            </c:extLst>
-          </c:dLbls>
-          <c:cat>
-            <c:numRef>
-              <c:f>Sheet1!$A$2:$A$14</c:f>
-              <c:numCache>
-                <c:formatCode>General</c:formatCode>
-                <c:ptCount val="13"/>
-                <c:pt idx="0">
-                  <c:v>1969</c:v>
-                </c:pt>
-                <c:pt idx="1">
-                  <c:v>1982</c:v>
-                </c:pt>
-                <c:pt idx="2">
-                  <c:v>1983</c:v>
-                </c:pt>
-                <c:pt idx="3">
-                  <c:v>1985</c:v>
-                </c:pt>
-                <c:pt idx="4">
-                  <c:v>1999</c:v>
-                </c:pt>
-                <c:pt idx="5">
-                  <c:v>2000</c:v>
-                </c:pt>
-                <c:pt idx="6">
-                  <c:v>2002</c:v>
-                </c:pt>
-                <c:pt idx="7">
-                  <c:v>2004</c:v>
-                </c:pt>
-                <c:pt idx="8">
-                  <c:v>2007</c:v>
-                </c:pt>
-                <c:pt idx="9">
-                  <c:v>2009</c:v>
-                </c:pt>
-                <c:pt idx="10">
-                  <c:v>2010</c:v>
-                </c:pt>
-                <c:pt idx="11">
-                  <c:v>2012</c:v>
-                </c:pt>
-                <c:pt idx="12">
-                  <c:v>2014</c:v>
-                </c:pt>
-              </c:numCache>
-            </c:numRef>
-          </c:cat>
-          <c:val>
-            <c:numRef>
-              <c:f>Sheet1!$B$2:$B$14</c:f>
-              <c:numCache>
-                <c:formatCode>General</c:formatCode>
-                <c:ptCount val="13"/>
-                <c:pt idx="0">
-                  <c:v>7.5000000000000002E-4</c:v>
-                </c:pt>
-                <c:pt idx="1">
-                  <c:v>5.0000000000000001E-4</c:v>
-                </c:pt>
-                <c:pt idx="2">
-                  <c:v>4.0000000000000002E-4</c:v>
-                </c:pt>
-                <c:pt idx="3">
-                  <c:v>0.08</c:v>
-                </c:pt>
-                <c:pt idx="4">
-                  <c:v>0.1</c:v>
-                </c:pt>
-                <c:pt idx="5">
-                  <c:v>0.17</c:v>
-                </c:pt>
-                <c:pt idx="6">
-                  <c:v>4</c:v>
-                </c:pt>
-                <c:pt idx="9">
-                  <c:v>35</c:v>
-                </c:pt>
-                <c:pt idx="10">
-                  <c:v>40</c:v>
-                </c:pt>
-                <c:pt idx="12">
-                  <c:v>100</c:v>
-                </c:pt>
-              </c:numCache>
-            </c:numRef>
-          </c:val>
-          <c:smooth val="0"/>
-          <c:extLst>
-            <c:ext xmlns:c16="http://schemas.microsoft.com/office/drawing/2014/chart" uri="{C3380CC4-5D6E-409C-BE32-E72D297353CC}">
-              <c16:uniqueId val="{00000015-1C57-B344-9675-175E7885B153}"/>
-            </c:ext>
-          </c:extLst>
-        </c:ser>
-        <c:dLbls>
-          <c:dLblPos val="t"/>
-          <c:showLegendKey val="0"/>
-          <c:showVal val="1"/>
-          <c:showCatName val="0"/>
-          <c:showSerName val="0"/>
-          <c:showPercent val="0"/>
-          <c:showBubbleSize val="0"/>
-        </c:dLbls>
-        <c:marker val="1"/>
-        <c:smooth val="0"/>
-        <c:axId val="1710182416"/>
-        <c:axId val="1543470192"/>
-      </c:lineChart>
-      <c:catAx>
-        <c:axId val="1710182416"/>
-        <c:scaling>
-          <c:orientation val="minMax"/>
-        </c:scaling>
-        <c:delete val="0"/>
-        <c:axPos val="b"/>
-        <c:title>
-          <c:tx>
-            <c:rich>
-              <a:bodyPr rot="0" vert="horz"/>
-              <a:lstStyle/>
-              <a:p>
-                <a:pPr>
-                  <a:defRPr sz="2000">
-                    <a:latin typeface="Seravek"/>
-                    <a:cs typeface="Seravek"/>
-                  </a:defRPr>
-                </a:pPr>
-                <a:r>
-                  <a:rPr lang="en-US" sz="2000" dirty="0">
-                    <a:latin typeface="Gadugi" charset="0"/>
-                    <a:ea typeface="Gadugi" charset="0"/>
-                    <a:cs typeface="Gadugi" charset="0"/>
-                  </a:rPr>
-                  <a:t>Year</a:t>
-                </a:r>
-              </a:p>
-            </c:rich>
-          </c:tx>
-          <c:overlay val="0"/>
-          <c:spPr>
-            <a:noFill/>
-            <a:ln>
-              <a:noFill/>
-            </a:ln>
-            <a:effectLst/>
-          </c:spPr>
-        </c:title>
-        <c:numFmt formatCode="General" sourceLinked="1"/>
-        <c:majorTickMark val="none"/>
-        <c:minorTickMark val="none"/>
-        <c:tickLblPos val="low"/>
-        <c:spPr>
-          <a:noFill/>
-          <a:ln w="9525" cap="flat" cmpd="sng" algn="ctr">
-            <a:solidFill>
-              <a:schemeClr val="tx1">
-                <a:lumMod val="15000"/>
-                <a:lumOff val="85000"/>
-              </a:schemeClr>
-            </a:solidFill>
-            <a:round/>
-          </a:ln>
-          <a:effectLst/>
-        </c:spPr>
-        <c:txPr>
-          <a:bodyPr rot="-60000000" vert="horz"/>
-          <a:lstStyle/>
-          <a:p>
-            <a:pPr>
-              <a:defRPr/>
-            </a:pPr>
-            <a:endParaRPr lang="en-US"/>
-          </a:p>
-        </c:txPr>
-        <c:crossAx val="1543470192"/>
-        <c:crosses val="autoZero"/>
-        <c:auto val="1"/>
-        <c:lblAlgn val="ctr"/>
-        <c:lblOffset val="100"/>
-        <c:noMultiLvlLbl val="0"/>
-      </c:catAx>
-      <c:valAx>
-        <c:axId val="1543470192"/>
-        <c:scaling>
-          <c:logBase val="10"/>
-          <c:orientation val="minMax"/>
-          <c:min val="4.0000000000000002E-4"/>
-        </c:scaling>
-        <c:delete val="0"/>
-        <c:axPos val="l"/>
-        <c:title>
-          <c:tx>
-            <c:rich>
-              <a:bodyPr rot="0" vert="horz" anchor="t" anchorCtr="0"/>
-              <a:lstStyle/>
-              <a:p>
-                <a:pPr>
-                  <a:defRPr sz="2000">
-                    <a:solidFill>
-                      <a:prstClr val="black"/>
-                    </a:solidFill>
-                    <a:latin typeface="Seravek"/>
-                    <a:cs typeface="Seravek"/>
-                  </a:defRPr>
-                </a:pPr>
-                <a:r>
-                  <a:rPr lang="en-US" sz="2000" dirty="0" err="1">
-                    <a:solidFill>
-                      <a:prstClr val="black"/>
-                    </a:solidFill>
-                    <a:latin typeface="Gadugi" charset="0"/>
-                    <a:ea typeface="Gadugi" charset="0"/>
-                    <a:cs typeface="Gadugi" charset="0"/>
-                  </a:rPr>
-                  <a:t>Gbit</a:t>
-                </a:r>
-                <a:r>
-                  <a:rPr lang="en-US" sz="2000" dirty="0">
-                    <a:solidFill>
-                      <a:prstClr val="black"/>
-                    </a:solidFill>
-                    <a:latin typeface="Gadugi" charset="0"/>
-                    <a:ea typeface="Gadugi" charset="0"/>
-                    <a:cs typeface="Gadugi" charset="0"/>
-                  </a:rPr>
-                  <a:t>/s</a:t>
-                </a:r>
-              </a:p>
-              <a:p>
-                <a:pPr>
-                  <a:defRPr sz="2000">
-                    <a:solidFill>
-                      <a:prstClr val="black"/>
-                    </a:solidFill>
-                    <a:latin typeface="Seravek"/>
-                    <a:cs typeface="Seravek"/>
-                  </a:defRPr>
-                </a:pPr>
-                <a:r>
-                  <a:rPr lang="en-US" sz="2000" dirty="0">
-                    <a:solidFill>
-                      <a:prstClr val="black"/>
-                    </a:solidFill>
-                    <a:latin typeface="Gadugi" charset="0"/>
-                    <a:ea typeface="Gadugi" charset="0"/>
-                    <a:cs typeface="Gadugi" charset="0"/>
-                  </a:rPr>
-                  <a:t>(log</a:t>
-                </a:r>
-              </a:p>
-              <a:p>
-                <a:pPr>
-                  <a:defRPr sz="2000">
-                    <a:solidFill>
-                      <a:prstClr val="black"/>
-                    </a:solidFill>
-                    <a:latin typeface="Seravek"/>
-                    <a:cs typeface="Seravek"/>
-                  </a:defRPr>
-                </a:pPr>
-                <a:r>
-                  <a:rPr lang="en-US" sz="2000" dirty="0">
-                    <a:solidFill>
-                      <a:prstClr val="black"/>
-                    </a:solidFill>
-                    <a:latin typeface="Gadugi" charset="0"/>
-                    <a:ea typeface="Gadugi" charset="0"/>
-                    <a:cs typeface="Gadugi" charset="0"/>
-                  </a:rPr>
-                  <a:t>scale)</a:t>
-                </a:r>
-              </a:p>
-            </c:rich>
-          </c:tx>
-          <c:layout>
-            <c:manualLayout>
-              <c:xMode val="edge"/>
-              <c:yMode val="edge"/>
-              <c:x val="0"/>
-              <c:y val="0.34282632353882603"/>
-            </c:manualLayout>
-          </c:layout>
-          <c:overlay val="0"/>
-          <c:spPr>
-            <a:noFill/>
-            <a:ln>
-              <a:noFill/>
-            </a:ln>
-            <a:effectLst/>
-          </c:spPr>
-        </c:title>
-        <c:numFmt formatCode="General" sourceLinked="1"/>
-        <c:majorTickMark val="none"/>
-        <c:minorTickMark val="none"/>
-        <c:tickLblPos val="low"/>
-        <c:spPr>
-          <a:noFill/>
-          <a:ln>
-            <a:noFill/>
-          </a:ln>
-          <a:effectLst/>
-        </c:spPr>
-        <c:txPr>
-          <a:bodyPr rot="-60000000" vert="horz"/>
-          <a:lstStyle/>
-          <a:p>
-            <a:pPr>
-              <a:defRPr/>
-            </a:pPr>
-            <a:endParaRPr lang="en-US"/>
-          </a:p>
-        </c:txPr>
-        <c:crossAx val="1710182416"/>
-        <c:crosses val="autoZero"/>
-        <c:crossBetween val="between"/>
-      </c:valAx>
-      <c:spPr>
-        <a:noFill/>
-        <a:ln>
-          <a:solidFill>
-            <a:schemeClr val="bg2">
-              <a:lumMod val="90000"/>
-            </a:schemeClr>
-          </a:solidFill>
-        </a:ln>
-        <a:effectLst/>
-      </c:spPr>
-    </c:plotArea>
-    <c:legend>
-      <c:legendPos val="r"/>
-      <c:layout>
-        <c:manualLayout>
-          <c:xMode val="edge"/>
-          <c:yMode val="edge"/>
-          <c:x val="0.692944640753828"/>
-          <c:y val="0.54587350361692599"/>
-          <c:w val="0.22676683082459201"/>
-          <c:h val="0.218185348782622"/>
-        </c:manualLayout>
-      </c:layout>
-      <c:overlay val="0"/>
-    </c:legend>
-    <c:plotVisOnly val="1"/>
-    <c:dispBlanksAs val="span"/>
-    <c:showDLblsOverMax val="0"/>
-  </c:chart>
-  <c:spPr>
-    <a:noFill/>
-    <a:ln>
-      <a:noFill/>
-    </a:ln>
-    <a:effectLst/>
-  </c:spPr>
-  <c:txPr>
-    <a:bodyPr/>
-    <a:lstStyle/>
-    <a:p>
-      <a:pPr>
-        <a:defRPr sz="1800"/>
-      </a:pPr>
-      <a:endParaRPr lang="en-US"/>
-    </a:p>
-  </c:txPr>
-  <c:externalData r:id="rId2">
-    <c:autoUpdate val="0"/>
-  </c:externalData>
-</c:chartSpace>
 </file>
 
 <file path=ppt/notesMasters/notesMaster1.xml><?xml version="1.0" encoding="utf-8"?>
@@ -2376,7 +930,10 @@
               <a:tabLst/>
               <a:defRPr/>
             </a:pPr>
-            <a:endParaRPr lang="en-US" baseline="0" dirty="0"/>
+            <a:r>
+              <a:rPr lang="en-US" baseline="0" dirty="0"/>
+              <a:t>One of the reasons very little has gotten into routers is there is a belief that if you have a fast router it won’t be programmable. Much of my work has been about how to have the best of both worlds.</a:t>
+            </a:r>
           </a:p>
         </p:txBody>
       </p:sp>
@@ -2460,7 +1017,27 @@
           <a:bodyPr/>
           <a:lstStyle/>
           <a:p>
-            <a:endParaRPr lang="en-US" baseline="0" dirty="0"/>
+            <a:pPr marL="0" marR="0" lvl="1" indent="0" algn="l" defTabSz="914400" rtl="0" eaLnBrk="1" fontAlgn="auto" latinLnBrk="0" hangingPunct="1">
+              <a:lnSpc>
+                <a:spcPct val="100000"/>
+              </a:lnSpc>
+              <a:spcBef>
+                <a:spcPts val="0"/>
+              </a:spcBef>
+              <a:spcAft>
+                <a:spcPts val="0"/>
+              </a:spcAft>
+              <a:buClrTx/>
+              <a:buSzTx/>
+              <a:buFontTx/>
+              <a:buNone/>
+              <a:tabLst/>
+              <a:defRPr/>
+            </a:pPr>
+            <a:r>
+              <a:rPr lang="en-US" baseline="0" dirty="0"/>
+              <a:t>I’ll discuss two pieces of work: Domino to run on the pipelines and PIFO to run on the scheduler.</a:t>
+            </a:r>
           </a:p>
         </p:txBody>
       </p:sp>
@@ -2479,7 +1056,7 @@
           <a:bodyPr/>
           <a:lstStyle/>
           <a:p>
-            <a:fld id="{16B09458-7AEF-4AD3-A567-0F11380064BE}" type="slidenum">
+            <a:fld id="{6C7315F8-E931-49D1-A989-C1759F952B9E}" type="slidenum">
               <a:rPr lang="en-US" smtClean="0"/>
               <a:t>5</a:t>
             </a:fld>
@@ -2490,7 +1067,7 @@
     </p:spTree>
     <p:extLst>
       <p:ext uri="{BB962C8B-B14F-4D97-AF65-F5344CB8AC3E}">
-        <p14:creationId xmlns:p14="http://schemas.microsoft.com/office/powerpoint/2010/main" val="970694325"/>
+        <p14:creationId xmlns:p14="http://schemas.microsoft.com/office/powerpoint/2010/main" val="1442729565"/>
       </p:ext>
     </p:extLst>
   </p:cSld>
@@ -2544,27 +1121,18 @@
           <a:bodyPr/>
           <a:lstStyle/>
           <a:p>
-            <a:pPr marL="0" marR="0" lvl="1" indent="0" algn="l" defTabSz="914400" rtl="0" eaLnBrk="1" fontAlgn="auto" latinLnBrk="0" hangingPunct="1">
-              <a:lnSpc>
-                <a:spcPct val="100000"/>
-              </a:lnSpc>
-              <a:spcBef>
-                <a:spcPts val="0"/>
-              </a:spcBef>
-              <a:spcAft>
-                <a:spcPts val="0"/>
-              </a:spcAft>
-              <a:buClrTx/>
-              <a:buSzTx/>
-              <a:buFontTx/>
-              <a:buNone/>
-              <a:tabLst/>
-              <a:defRPr/>
+            <a:pPr marL="228600" indent="-228600">
+              <a:buAutoNum type="arabicPeriod"/>
             </a:pPr>
             <a:r>
               <a:rPr lang="en-US" baseline="0" dirty="0"/>
-              <a:t>I’ll discuss two pieces of work: Domino to run on the pipelines and PIFO to run on the scheduler.</a:t>
+              <a:t>Skip </a:t>
             </a:r>
+            <a:r>
+              <a:rPr lang="en-US" baseline="0"/>
+              <a:t>if required.</a:t>
+            </a:r>
+            <a:endParaRPr lang="en-US" baseline="0" dirty="0"/>
           </a:p>
         </p:txBody>
       </p:sp>
@@ -2583,7 +1151,7 @@
           <a:bodyPr/>
           <a:lstStyle/>
           <a:p>
-            <a:fld id="{6C7315F8-E931-49D1-A989-C1759F952B9E}" type="slidenum">
+            <a:fld id="{16B09458-7AEF-4AD3-A567-0F11380064BE}" type="slidenum">
               <a:rPr lang="en-US" smtClean="0"/>
               <a:t>6</a:t>
             </a:fld>
@@ -2594,7 +1162,7 @@
     </p:spTree>
     <p:extLst>
       <p:ext uri="{BB962C8B-B14F-4D97-AF65-F5344CB8AC3E}">
-        <p14:creationId xmlns:p14="http://schemas.microsoft.com/office/powerpoint/2010/main" val="1442729565"/>
+        <p14:creationId xmlns:p14="http://schemas.microsoft.com/office/powerpoint/2010/main" val="2573864223"/>
       </p:ext>
     </p:extLst>
   </p:cSld>
@@ -2648,93 +1216,6 @@
           <a:bodyPr/>
           <a:lstStyle/>
           <a:p>
-            <a:pPr marL="228600" indent="-228600">
-              <a:buAutoNum type="arabicPeriod"/>
-            </a:pPr>
-            <a:endParaRPr lang="en-US" baseline="0" dirty="0"/>
-          </a:p>
-        </p:txBody>
-      </p:sp>
-      <p:sp>
-        <p:nvSpPr>
-          <p:cNvPr id="4" name="Slide Number Placeholder 3"/>
-          <p:cNvSpPr>
-            <a:spLocks noGrp="1"/>
-          </p:cNvSpPr>
-          <p:nvPr>
-            <p:ph type="sldNum" sz="quarter" idx="10"/>
-          </p:nvPr>
-        </p:nvSpPr>
-        <p:spPr/>
-        <p:txBody>
-          <a:bodyPr/>
-          <a:lstStyle/>
-          <a:p>
-            <a:fld id="{16B09458-7AEF-4AD3-A567-0F11380064BE}" type="slidenum">
-              <a:rPr lang="en-US" smtClean="0"/>
-              <a:t>7</a:t>
-            </a:fld>
-            <a:endParaRPr lang="en-US"/>
-          </a:p>
-        </p:txBody>
-      </p:sp>
-    </p:spTree>
-    <p:extLst>
-      <p:ext uri="{BB962C8B-B14F-4D97-AF65-F5344CB8AC3E}">
-        <p14:creationId xmlns:p14="http://schemas.microsoft.com/office/powerpoint/2010/main" val="2573864223"/>
-      </p:ext>
-    </p:extLst>
-  </p:cSld>
-  <p:clrMapOvr>
-    <a:masterClrMapping/>
-  </p:clrMapOvr>
-</p:notes>
-</file>
-
-<file path=ppt/notesSlides/notesSlide8.xml><?xml version="1.0" encoding="utf-8"?>
-<p:notes xmlns:a="http://schemas.openxmlformats.org/drawingml/2006/main" xmlns:r="http://schemas.openxmlformats.org/officeDocument/2006/relationships" xmlns:p="http://schemas.openxmlformats.org/presentationml/2006/main">
-  <p:cSld>
-    <p:spTree>
-      <p:nvGrpSpPr>
-        <p:cNvPr id="1" name=""/>
-        <p:cNvGrpSpPr/>
-        <p:nvPr/>
-      </p:nvGrpSpPr>
-      <p:grpSpPr>
-        <a:xfrm>
-          <a:off x="0" y="0"/>
-          <a:ext cx="0" cy="0"/>
-          <a:chOff x="0" y="0"/>
-          <a:chExt cx="0" cy="0"/>
-        </a:xfrm>
-      </p:grpSpPr>
-      <p:sp>
-        <p:nvSpPr>
-          <p:cNvPr id="2" name="Slide Image Placeholder 1"/>
-          <p:cNvSpPr>
-            <a:spLocks noGrp="1" noRot="1" noChangeAspect="1"/>
-          </p:cNvSpPr>
-          <p:nvPr>
-            <p:ph type="sldImg"/>
-          </p:nvPr>
-        </p:nvSpPr>
-        <p:spPr/>
-      </p:sp>
-      <p:sp>
-        <p:nvSpPr>
-          <p:cNvPr id="3" name="Notes Placeholder 2"/>
-          <p:cNvSpPr>
-            <a:spLocks noGrp="1"/>
-          </p:cNvSpPr>
-          <p:nvPr>
-            <p:ph type="body" idx="1"/>
-          </p:nvPr>
-        </p:nvSpPr>
-        <p:spPr/>
-        <p:txBody>
-          <a:bodyPr/>
-          <a:lstStyle/>
-          <a:p>
             <a:pPr marL="228600" marR="0" lvl="0" indent="-228600" algn="l" defTabSz="914400" rtl="0" eaLnBrk="1" fontAlgn="auto" latinLnBrk="0" hangingPunct="1">
               <a:lnSpc>
                 <a:spcPct val="100000"/>
@@ -2938,7 +1419,7 @@
           <a:p>
             <a:fld id="{16B09458-7AEF-4AD3-A567-0F11380064BE}" type="slidenum">
               <a:rPr lang="en-US" smtClean="0"/>
-              <a:t>8</a:t>
+              <a:t>7</a:t>
             </a:fld>
             <a:endParaRPr lang="en-US"/>
           </a:p>
@@ -9856,807 +8337,6 @@
       </p:grpSpPr>
       <p:sp>
         <p:nvSpPr>
-          <p:cNvPr id="2" name="Title 1"/>
-          <p:cNvSpPr>
-            <a:spLocks noGrp="1"/>
-          </p:cNvSpPr>
-          <p:nvPr>
-            <p:ph type="title"/>
-          </p:nvPr>
-        </p:nvSpPr>
-        <p:spPr/>
-        <p:txBody>
-          <a:bodyPr/>
-          <a:lstStyle/>
-          <a:p>
-            <a:r>
-              <a:rPr lang="en-US" dirty="0">
-                <a:latin typeface="Gadugi" panose="020B0502040204020203" pitchFamily="34" charset="0"/>
-              </a:rPr>
-              <a:t>One approach: Use a </a:t>
-            </a:r>
-            <a:r>
-              <a:rPr lang="en-US" dirty="0"/>
-              <a:t>s</a:t>
-            </a:r>
-            <a:r>
-              <a:rPr lang="en-US" dirty="0">
-                <a:latin typeface="Gadugi" panose="020B0502040204020203" pitchFamily="34" charset="0"/>
-              </a:rPr>
-              <a:t>oftware router</a:t>
-            </a:r>
-          </a:p>
-        </p:txBody>
-      </p:sp>
-      <p:graphicFrame>
-        <p:nvGraphicFramePr>
-          <p:cNvPr id="9" name="Chart 8"/>
-          <p:cNvGraphicFramePr/>
-          <p:nvPr>
-            <p:extLst>
-              <p:ext uri="{D42A27DB-BD31-4B8C-83A1-F6EECF244321}">
-                <p14:modId xmlns:p14="http://schemas.microsoft.com/office/powerpoint/2010/main" val="703209873"/>
-              </p:ext>
-            </p:extLst>
-          </p:nvPr>
-        </p:nvGraphicFramePr>
-        <p:xfrm>
-          <a:off x="647700" y="1371600"/>
-          <a:ext cx="10782300" cy="4267200"/>
-        </p:xfrm>
-        <a:graphic>
-          <a:graphicData uri="http://schemas.openxmlformats.org/drawingml/2006/chart">
-            <c:chart xmlns:c="http://schemas.openxmlformats.org/drawingml/2006/chart" xmlns:r="http://schemas.openxmlformats.org/officeDocument/2006/relationships" r:id="rId3"/>
-          </a:graphicData>
-        </a:graphic>
-      </p:graphicFrame>
-      <p:sp>
-        <p:nvSpPr>
-          <p:cNvPr id="6" name="Rounded Rectangle 5"/>
-          <p:cNvSpPr/>
-          <p:nvPr/>
-        </p:nvSpPr>
-        <p:spPr>
-          <a:xfrm>
-            <a:off x="685800" y="5715000"/>
-            <a:ext cx="11010900" cy="495300"/>
-          </a:xfrm>
-          <a:prstGeom prst="roundRect">
-            <a:avLst/>
-          </a:prstGeom>
-          <a:solidFill>
-            <a:srgbClr val="901028"/>
-          </a:solidFill>
-          <a:ln/>
-          <a:scene3d>
-            <a:camera prst="orthographicFront"/>
-            <a:lightRig rig="threePt" dir="t"/>
-          </a:scene3d>
-          <a:sp3d>
-            <a:bevelT/>
-          </a:sp3d>
-        </p:spPr>
-        <p:style>
-          <a:lnRef idx="0">
-            <a:schemeClr val="dk1"/>
-          </a:lnRef>
-          <a:fillRef idx="3">
-            <a:schemeClr val="dk1"/>
-          </a:fillRef>
-          <a:effectRef idx="3">
-            <a:schemeClr val="dk1"/>
-          </a:effectRef>
-          <a:fontRef idx="minor">
-            <a:schemeClr val="lt1"/>
-          </a:fontRef>
-        </p:style>
-        <p:txBody>
-          <a:bodyPr rtlCol="0" anchor="ctr"/>
-          <a:lstStyle/>
-          <a:p>
-            <a:pPr algn="ctr"/>
-            <a:r>
-              <a:rPr lang="en-US" sz="3200" dirty="0"/>
-              <a:t>Software routers 10—100x slower than the fastest routers</a:t>
-            </a:r>
-          </a:p>
-        </p:txBody>
-      </p:sp>
-      <p:sp>
-        <p:nvSpPr>
-          <p:cNvPr id="5" name="Rounded Rectangle 4"/>
-          <p:cNvSpPr/>
-          <p:nvPr/>
-        </p:nvSpPr>
-        <p:spPr>
-          <a:xfrm>
-            <a:off x="685800" y="6286500"/>
-            <a:ext cx="11010900" cy="495300"/>
-          </a:xfrm>
-          <a:prstGeom prst="roundRect">
-            <a:avLst/>
-          </a:prstGeom>
-          <a:solidFill>
-            <a:srgbClr val="901028"/>
-          </a:solidFill>
-          <a:ln/>
-          <a:scene3d>
-            <a:camera prst="orthographicFront"/>
-            <a:lightRig rig="threePt" dir="t"/>
-          </a:scene3d>
-          <a:sp3d>
-            <a:bevelT/>
-          </a:sp3d>
-        </p:spPr>
-        <p:style>
-          <a:lnRef idx="0">
-            <a:schemeClr val="dk1"/>
-          </a:lnRef>
-          <a:fillRef idx="3">
-            <a:schemeClr val="dk1"/>
-          </a:fillRef>
-          <a:effectRef idx="3">
-            <a:schemeClr val="dk1"/>
-          </a:effectRef>
-          <a:fontRef idx="minor">
-            <a:schemeClr val="lt1"/>
-          </a:fontRef>
-        </p:style>
-        <p:txBody>
-          <a:bodyPr rtlCol="0" anchor="ctr"/>
-          <a:lstStyle/>
-          <a:p>
-            <a:pPr algn="ctr"/>
-            <a:r>
-              <a:rPr lang="en-US" sz="3200" dirty="0"/>
-              <a:t>Software routers suffer from non-deterministic performance</a:t>
-            </a:r>
-          </a:p>
-        </p:txBody>
-      </p:sp>
-    </p:spTree>
-    <p:extLst>
-      <p:ext uri="{BB962C8B-B14F-4D97-AF65-F5344CB8AC3E}">
-        <p14:creationId xmlns:p14="http://schemas.microsoft.com/office/powerpoint/2010/main" val="2953721876"/>
-      </p:ext>
-    </p:extLst>
-  </p:cSld>
-  <p:clrMapOvr>
-    <a:masterClrMapping/>
-  </p:clrMapOvr>
-  <p:timing>
-    <p:tnLst>
-      <p:par>
-        <p:cTn id="1" dur="indefinite" restart="never" nodeType="tmRoot">
-          <p:childTnLst>
-            <p:seq concurrent="1" nextAc="seek">
-              <p:cTn id="2" dur="indefinite" nodeType="mainSeq">
-                <p:childTnLst>
-                  <p:par>
-                    <p:cTn id="3" fill="hold">
-                      <p:stCondLst>
-                        <p:cond delay="indefinite"/>
-                      </p:stCondLst>
-                      <p:childTnLst>
-                        <p:par>
-                          <p:cTn id="4" fill="hold">
-                            <p:stCondLst>
-                              <p:cond delay="0"/>
-                            </p:stCondLst>
-                            <p:childTnLst>
-                              <p:par>
-                                <p:cTn id="5" presetID="22" presetClass="entr" presetSubtype="8" fill="hold" grpId="0" nodeType="clickEffect">
-                                  <p:stCondLst>
-                                    <p:cond delay="0"/>
-                                  </p:stCondLst>
-                                  <p:childTnLst>
-                                    <p:set>
-                                      <p:cBhvr>
-                                        <p:cTn id="6" dur="1" fill="hold">
-                                          <p:stCondLst>
-                                            <p:cond delay="0"/>
-                                          </p:stCondLst>
-                                        </p:cTn>
-                                        <p:tgtEl>
-                                          <p:spTgt spid="9">
-                                            <p:graphicEl>
-                                              <a:chart seriesIdx="-3" categoryIdx="-3" bldStep="gridLegend"/>
-                                            </p:graphicEl>
-                                          </p:spTgt>
-                                        </p:tgtEl>
-                                        <p:attrNameLst>
-                                          <p:attrName>style.visibility</p:attrName>
-                                        </p:attrNameLst>
-                                      </p:cBhvr>
-                                      <p:to>
-                                        <p:strVal val="visible"/>
-                                      </p:to>
-                                    </p:set>
-                                    <p:animEffect transition="in" filter="wipe(left)">
-                                      <p:cBhvr>
-                                        <p:cTn id="7" dur="500"/>
-                                        <p:tgtEl>
-                                          <p:spTgt spid="9">
-                                            <p:graphicEl>
-                                              <a:chart seriesIdx="-3" categoryIdx="-3" bldStep="gridLegend"/>
-                                            </p:graphicEl>
-                                          </p:spTgt>
-                                        </p:tgtEl>
-                                      </p:cBhvr>
-                                    </p:animEffect>
-                                  </p:childTnLst>
-                                </p:cTn>
-                              </p:par>
-                            </p:childTnLst>
-                          </p:cTn>
-                        </p:par>
-                      </p:childTnLst>
-                    </p:cTn>
-                  </p:par>
-                  <p:par>
-                    <p:cTn id="8" fill="hold">
-                      <p:stCondLst>
-                        <p:cond delay="indefinite"/>
-                      </p:stCondLst>
-                      <p:childTnLst>
-                        <p:par>
-                          <p:cTn id="9" fill="hold">
-                            <p:stCondLst>
-                              <p:cond delay="0"/>
-                            </p:stCondLst>
-                            <p:childTnLst>
-                              <p:par>
-                                <p:cTn id="10" presetID="1" presetClass="entr" presetSubtype="0" fill="hold" grpId="0" nodeType="clickEffect">
-                                  <p:stCondLst>
-                                    <p:cond delay="0"/>
-                                  </p:stCondLst>
-                                  <p:childTnLst>
-                                    <p:set>
-                                      <p:cBhvr>
-                                        <p:cTn id="11" dur="1" fill="hold">
-                                          <p:stCondLst>
-                                            <p:cond delay="0"/>
-                                          </p:stCondLst>
-                                        </p:cTn>
-                                        <p:tgtEl>
-                                          <p:spTgt spid="9">
-                                            <p:graphicEl>
-                                              <a:chart seriesIdx="-4" categoryIdx="0" bldStep="category"/>
-                                            </p:graphicEl>
-                                          </p:spTgt>
-                                        </p:tgtEl>
-                                        <p:attrNameLst>
-                                          <p:attrName>style.visibility</p:attrName>
-                                        </p:attrNameLst>
-                                      </p:cBhvr>
-                                      <p:to>
-                                        <p:strVal val="visible"/>
-                                      </p:to>
-                                    </p:set>
-                                  </p:childTnLst>
-                                </p:cTn>
-                              </p:par>
-                              <p:par>
-                                <p:cTn id="12" presetID="1" presetClass="entr" presetSubtype="0" fill="hold" grpId="0" nodeType="withEffect">
-                                  <p:stCondLst>
-                                    <p:cond delay="0"/>
-                                  </p:stCondLst>
-                                  <p:childTnLst>
-                                    <p:set>
-                                      <p:cBhvr>
-                                        <p:cTn id="13" dur="1" fill="hold">
-                                          <p:stCondLst>
-                                            <p:cond delay="0"/>
-                                          </p:stCondLst>
-                                        </p:cTn>
-                                        <p:tgtEl>
-                                          <p:spTgt spid="9">
-                                            <p:graphicEl>
-                                              <a:chart seriesIdx="-4" categoryIdx="1" bldStep="category"/>
-                                            </p:graphicEl>
-                                          </p:spTgt>
-                                        </p:tgtEl>
-                                        <p:attrNameLst>
-                                          <p:attrName>style.visibility</p:attrName>
-                                        </p:attrNameLst>
-                                      </p:cBhvr>
-                                      <p:to>
-                                        <p:strVal val="visible"/>
-                                      </p:to>
-                                    </p:set>
-                                  </p:childTnLst>
-                                </p:cTn>
-                              </p:par>
-                              <p:par>
-                                <p:cTn id="14" presetID="1" presetClass="entr" presetSubtype="0" fill="hold" grpId="0" nodeType="withEffect">
-                                  <p:stCondLst>
-                                    <p:cond delay="0"/>
-                                  </p:stCondLst>
-                                  <p:childTnLst>
-                                    <p:set>
-                                      <p:cBhvr>
-                                        <p:cTn id="15" dur="1" fill="hold">
-                                          <p:stCondLst>
-                                            <p:cond delay="0"/>
-                                          </p:stCondLst>
-                                        </p:cTn>
-                                        <p:tgtEl>
-                                          <p:spTgt spid="9">
-                                            <p:graphicEl>
-                                              <a:chart seriesIdx="-4" categoryIdx="2" bldStep="category"/>
-                                            </p:graphicEl>
-                                          </p:spTgt>
-                                        </p:tgtEl>
-                                        <p:attrNameLst>
-                                          <p:attrName>style.visibility</p:attrName>
-                                        </p:attrNameLst>
-                                      </p:cBhvr>
-                                      <p:to>
-                                        <p:strVal val="visible"/>
-                                      </p:to>
-                                    </p:set>
-                                  </p:childTnLst>
-                                </p:cTn>
-                              </p:par>
-                              <p:par>
-                                <p:cTn id="16" presetID="1" presetClass="entr" presetSubtype="0" fill="hold" grpId="0" nodeType="withEffect">
-                                  <p:stCondLst>
-                                    <p:cond delay="0"/>
-                                  </p:stCondLst>
-                                  <p:childTnLst>
-                                    <p:set>
-                                      <p:cBhvr>
-                                        <p:cTn id="17" dur="1" fill="hold">
-                                          <p:stCondLst>
-                                            <p:cond delay="0"/>
-                                          </p:stCondLst>
-                                        </p:cTn>
-                                        <p:tgtEl>
-                                          <p:spTgt spid="9">
-                                            <p:graphicEl>
-                                              <a:chart seriesIdx="-4" categoryIdx="3" bldStep="category"/>
-                                            </p:graphicEl>
-                                          </p:spTgt>
-                                        </p:tgtEl>
-                                        <p:attrNameLst>
-                                          <p:attrName>style.visibility</p:attrName>
-                                        </p:attrNameLst>
-                                      </p:cBhvr>
-                                      <p:to>
-                                        <p:strVal val="visible"/>
-                                      </p:to>
-                                    </p:set>
-                                  </p:childTnLst>
-                                </p:cTn>
-                              </p:par>
-                              <p:par>
-                                <p:cTn id="18" presetID="1" presetClass="entr" presetSubtype="0" fill="hold" grpId="0" nodeType="withEffect">
-                                  <p:stCondLst>
-                                    <p:cond delay="0"/>
-                                  </p:stCondLst>
-                                  <p:childTnLst>
-                                    <p:set>
-                                      <p:cBhvr>
-                                        <p:cTn id="19" dur="1" fill="hold">
-                                          <p:stCondLst>
-                                            <p:cond delay="0"/>
-                                          </p:stCondLst>
-                                        </p:cTn>
-                                        <p:tgtEl>
-                                          <p:spTgt spid="9">
-                                            <p:graphicEl>
-                                              <a:chart seriesIdx="-4" categoryIdx="4" bldStep="category"/>
-                                            </p:graphicEl>
-                                          </p:spTgt>
-                                        </p:tgtEl>
-                                        <p:attrNameLst>
-                                          <p:attrName>style.visibility</p:attrName>
-                                        </p:attrNameLst>
-                                      </p:cBhvr>
-                                      <p:to>
-                                        <p:strVal val="visible"/>
-                                      </p:to>
-                                    </p:set>
-                                  </p:childTnLst>
-                                </p:cTn>
-                              </p:par>
-                              <p:par>
-                                <p:cTn id="20" presetID="1" presetClass="entr" presetSubtype="0" fill="hold" grpId="0" nodeType="withEffect">
-                                  <p:stCondLst>
-                                    <p:cond delay="0"/>
-                                  </p:stCondLst>
-                                  <p:childTnLst>
-                                    <p:set>
-                                      <p:cBhvr>
-                                        <p:cTn id="21" dur="1" fill="hold">
-                                          <p:stCondLst>
-                                            <p:cond delay="0"/>
-                                          </p:stCondLst>
-                                        </p:cTn>
-                                        <p:tgtEl>
-                                          <p:spTgt spid="9">
-                                            <p:graphicEl>
-                                              <a:chart seriesIdx="-4" categoryIdx="5" bldStep="category"/>
-                                            </p:graphicEl>
-                                          </p:spTgt>
-                                        </p:tgtEl>
-                                        <p:attrNameLst>
-                                          <p:attrName>style.visibility</p:attrName>
-                                        </p:attrNameLst>
-                                      </p:cBhvr>
-                                      <p:to>
-                                        <p:strVal val="visible"/>
-                                      </p:to>
-                                    </p:set>
-                                  </p:childTnLst>
-                                </p:cTn>
-                              </p:par>
-                              <p:par>
-                                <p:cTn id="22" presetID="1" presetClass="entr" presetSubtype="0" fill="hold" grpId="0" nodeType="withEffect">
-                                  <p:stCondLst>
-                                    <p:cond delay="0"/>
-                                  </p:stCondLst>
-                                  <p:childTnLst>
-                                    <p:set>
-                                      <p:cBhvr>
-                                        <p:cTn id="23" dur="1" fill="hold">
-                                          <p:stCondLst>
-                                            <p:cond delay="0"/>
-                                          </p:stCondLst>
-                                        </p:cTn>
-                                        <p:tgtEl>
-                                          <p:spTgt spid="9">
-                                            <p:graphicEl>
-                                              <a:chart seriesIdx="-4" categoryIdx="6" bldStep="category"/>
-                                            </p:graphicEl>
-                                          </p:spTgt>
-                                        </p:tgtEl>
-                                        <p:attrNameLst>
-                                          <p:attrName>style.visibility</p:attrName>
-                                        </p:attrNameLst>
-                                      </p:cBhvr>
-                                      <p:to>
-                                        <p:strVal val="visible"/>
-                                      </p:to>
-                                    </p:set>
-                                  </p:childTnLst>
-                                </p:cTn>
-                              </p:par>
-                              <p:par>
-                                <p:cTn id="24" presetID="1" presetClass="entr" presetSubtype="0" fill="hold" grpId="0" nodeType="withEffect">
-                                  <p:stCondLst>
-                                    <p:cond delay="0"/>
-                                  </p:stCondLst>
-                                  <p:childTnLst>
-                                    <p:set>
-                                      <p:cBhvr>
-                                        <p:cTn id="25" dur="1" fill="hold">
-                                          <p:stCondLst>
-                                            <p:cond delay="0"/>
-                                          </p:stCondLst>
-                                        </p:cTn>
-                                        <p:tgtEl>
-                                          <p:spTgt spid="9">
-                                            <p:graphicEl>
-                                              <a:chart seriesIdx="-4" categoryIdx="7" bldStep="category"/>
-                                            </p:graphicEl>
-                                          </p:spTgt>
-                                        </p:tgtEl>
-                                        <p:attrNameLst>
-                                          <p:attrName>style.visibility</p:attrName>
-                                        </p:attrNameLst>
-                                      </p:cBhvr>
-                                      <p:to>
-                                        <p:strVal val="visible"/>
-                                      </p:to>
-                                    </p:set>
-                                  </p:childTnLst>
-                                </p:cTn>
-                              </p:par>
-                              <p:par>
-                                <p:cTn id="26" presetID="1" presetClass="entr" presetSubtype="0" fill="hold" grpId="0" nodeType="withEffect">
-                                  <p:stCondLst>
-                                    <p:cond delay="0"/>
-                                  </p:stCondLst>
-                                  <p:childTnLst>
-                                    <p:set>
-                                      <p:cBhvr>
-                                        <p:cTn id="27" dur="1" fill="hold">
-                                          <p:stCondLst>
-                                            <p:cond delay="0"/>
-                                          </p:stCondLst>
-                                        </p:cTn>
-                                        <p:tgtEl>
-                                          <p:spTgt spid="9">
-                                            <p:graphicEl>
-                                              <a:chart seriesIdx="-4" categoryIdx="8" bldStep="category"/>
-                                            </p:graphicEl>
-                                          </p:spTgt>
-                                        </p:tgtEl>
-                                        <p:attrNameLst>
-                                          <p:attrName>style.visibility</p:attrName>
-                                        </p:attrNameLst>
-                                      </p:cBhvr>
-                                      <p:to>
-                                        <p:strVal val="visible"/>
-                                      </p:to>
-                                    </p:set>
-                                  </p:childTnLst>
-                                </p:cTn>
-                              </p:par>
-                              <p:par>
-                                <p:cTn id="28" presetID="1" presetClass="entr" presetSubtype="0" fill="hold" grpId="0" nodeType="withEffect">
-                                  <p:stCondLst>
-                                    <p:cond delay="0"/>
-                                  </p:stCondLst>
-                                  <p:childTnLst>
-                                    <p:set>
-                                      <p:cBhvr>
-                                        <p:cTn id="29" dur="1" fill="hold">
-                                          <p:stCondLst>
-                                            <p:cond delay="0"/>
-                                          </p:stCondLst>
-                                        </p:cTn>
-                                        <p:tgtEl>
-                                          <p:spTgt spid="9">
-                                            <p:graphicEl>
-                                              <a:chart seriesIdx="-4" categoryIdx="9" bldStep="category"/>
-                                            </p:graphicEl>
-                                          </p:spTgt>
-                                        </p:tgtEl>
-                                        <p:attrNameLst>
-                                          <p:attrName>style.visibility</p:attrName>
-                                        </p:attrNameLst>
-                                      </p:cBhvr>
-                                      <p:to>
-                                        <p:strVal val="visible"/>
-                                      </p:to>
-                                    </p:set>
-                                  </p:childTnLst>
-                                </p:cTn>
-                              </p:par>
-                              <p:par>
-                                <p:cTn id="30" presetID="1" presetClass="entr" presetSubtype="0" fill="hold" grpId="0" nodeType="withEffect">
-                                  <p:stCondLst>
-                                    <p:cond delay="0"/>
-                                  </p:stCondLst>
-                                  <p:childTnLst>
-                                    <p:set>
-                                      <p:cBhvr>
-                                        <p:cTn id="31" dur="1" fill="hold">
-                                          <p:stCondLst>
-                                            <p:cond delay="0"/>
-                                          </p:stCondLst>
-                                        </p:cTn>
-                                        <p:tgtEl>
-                                          <p:spTgt spid="9">
-                                            <p:graphicEl>
-                                              <a:chart seriesIdx="-4" categoryIdx="10" bldStep="category"/>
-                                            </p:graphicEl>
-                                          </p:spTgt>
-                                        </p:tgtEl>
-                                        <p:attrNameLst>
-                                          <p:attrName>style.visibility</p:attrName>
-                                        </p:attrNameLst>
-                                      </p:cBhvr>
-                                      <p:to>
-                                        <p:strVal val="visible"/>
-                                      </p:to>
-                                    </p:set>
-                                  </p:childTnLst>
-                                </p:cTn>
-                              </p:par>
-                              <p:par>
-                                <p:cTn id="32" presetID="1" presetClass="entr" presetSubtype="0" fill="hold" grpId="0" nodeType="withEffect">
-                                  <p:stCondLst>
-                                    <p:cond delay="0"/>
-                                  </p:stCondLst>
-                                  <p:childTnLst>
-                                    <p:set>
-                                      <p:cBhvr>
-                                        <p:cTn id="33" dur="1" fill="hold">
-                                          <p:stCondLst>
-                                            <p:cond delay="0"/>
-                                          </p:stCondLst>
-                                        </p:cTn>
-                                        <p:tgtEl>
-                                          <p:spTgt spid="9">
-                                            <p:graphicEl>
-                                              <a:chart seriesIdx="-4" categoryIdx="11" bldStep="category"/>
-                                            </p:graphicEl>
-                                          </p:spTgt>
-                                        </p:tgtEl>
-                                        <p:attrNameLst>
-                                          <p:attrName>style.visibility</p:attrName>
-                                        </p:attrNameLst>
-                                      </p:cBhvr>
-                                      <p:to>
-                                        <p:strVal val="visible"/>
-                                      </p:to>
-                                    </p:set>
-                                  </p:childTnLst>
-                                </p:cTn>
-                              </p:par>
-                              <p:par>
-                                <p:cTn id="34" presetID="1" presetClass="entr" presetSubtype="0" fill="hold" grpId="0" nodeType="withEffect">
-                                  <p:stCondLst>
-                                    <p:cond delay="0"/>
-                                  </p:stCondLst>
-                                  <p:childTnLst>
-                                    <p:set>
-                                      <p:cBhvr>
-                                        <p:cTn id="35" dur="1" fill="hold">
-                                          <p:stCondLst>
-                                            <p:cond delay="0"/>
-                                          </p:stCondLst>
-                                        </p:cTn>
-                                        <p:tgtEl>
-                                          <p:spTgt spid="9">
-                                            <p:graphicEl>
-                                              <a:chart seriesIdx="-4" categoryIdx="12" bldStep="category"/>
-                                            </p:graphicEl>
-                                          </p:spTgt>
-                                        </p:tgtEl>
-                                        <p:attrNameLst>
-                                          <p:attrName>style.visibility</p:attrName>
-                                        </p:attrNameLst>
-                                      </p:cBhvr>
-                                      <p:to>
-                                        <p:strVal val="visible"/>
-                                      </p:to>
-                                    </p:set>
-                                  </p:childTnLst>
-                                </p:cTn>
-                              </p:par>
-                            </p:childTnLst>
-                          </p:cTn>
-                        </p:par>
-                      </p:childTnLst>
-                    </p:cTn>
-                  </p:par>
-                  <p:par>
-                    <p:cTn id="36" fill="hold">
-                      <p:stCondLst>
-                        <p:cond delay="indefinite"/>
-                      </p:stCondLst>
-                      <p:childTnLst>
-                        <p:par>
-                          <p:cTn id="37" fill="hold">
-                            <p:stCondLst>
-                              <p:cond delay="0"/>
-                            </p:stCondLst>
-                            <p:childTnLst>
-                              <p:par>
-                                <p:cTn id="38" presetID="1" presetClass="entr" presetSubtype="0" fill="hold" grpId="0" nodeType="clickEffect">
-                                  <p:stCondLst>
-                                    <p:cond delay="0"/>
-                                  </p:stCondLst>
-                                  <p:childTnLst>
-                                    <p:set>
-                                      <p:cBhvr>
-                                        <p:cTn id="39" dur="1" fill="hold">
-                                          <p:stCondLst>
-                                            <p:cond delay="0"/>
-                                          </p:stCondLst>
-                                        </p:cTn>
-                                        <p:tgtEl>
-                                          <p:spTgt spid="6"/>
-                                        </p:tgtEl>
-                                        <p:attrNameLst>
-                                          <p:attrName>style.visibility</p:attrName>
-                                        </p:attrNameLst>
-                                      </p:cBhvr>
-                                      <p:to>
-                                        <p:strVal val="visible"/>
-                                      </p:to>
-                                    </p:set>
-                                  </p:childTnLst>
-                                </p:cTn>
-                              </p:par>
-                            </p:childTnLst>
-                          </p:cTn>
-                        </p:par>
-                      </p:childTnLst>
-                    </p:cTn>
-                  </p:par>
-                  <p:par>
-                    <p:cTn id="40" fill="hold">
-                      <p:stCondLst>
-                        <p:cond delay="indefinite"/>
-                      </p:stCondLst>
-                      <p:childTnLst>
-                        <p:par>
-                          <p:cTn id="41" fill="hold">
-                            <p:stCondLst>
-                              <p:cond delay="0"/>
-                            </p:stCondLst>
-                            <p:childTnLst>
-                              <p:par>
-                                <p:cTn id="42" presetID="1" presetClass="entr" presetSubtype="0" fill="hold" grpId="0" nodeType="clickEffect">
-                                  <p:stCondLst>
-                                    <p:cond delay="0"/>
-                                  </p:stCondLst>
-                                  <p:childTnLst>
-                                    <p:set>
-                                      <p:cBhvr>
-                                        <p:cTn id="43" dur="1" fill="hold">
-                                          <p:stCondLst>
-                                            <p:cond delay="0"/>
-                                          </p:stCondLst>
-                                        </p:cTn>
-                                        <p:tgtEl>
-                                          <p:spTgt spid="5"/>
-                                        </p:tgtEl>
-                                        <p:attrNameLst>
-                                          <p:attrName>style.visibility</p:attrName>
-                                        </p:attrNameLst>
-                                      </p:cBhvr>
-                                      <p:to>
-                                        <p:strVal val="visible"/>
-                                      </p:to>
-                                    </p:set>
-                                  </p:childTnLst>
-                                </p:cTn>
-                              </p:par>
-                            </p:childTnLst>
-                          </p:cTn>
-                        </p:par>
-                      </p:childTnLst>
-                    </p:cTn>
-                  </p:par>
-                </p:childTnLst>
-              </p:cTn>
-              <p:prevCondLst>
-                <p:cond evt="onPrev" delay="0">
-                  <p:tgtEl>
-                    <p:sldTgt/>
-                  </p:tgtEl>
-                </p:cond>
-              </p:prevCondLst>
-              <p:nextCondLst>
-                <p:cond evt="onNext" delay="0">
-                  <p:tgtEl>
-                    <p:sldTgt/>
-                  </p:tgtEl>
-                </p:cond>
-              </p:nextCondLst>
-            </p:seq>
-          </p:childTnLst>
-        </p:cTn>
-      </p:par>
-    </p:tnLst>
-    <p:bldLst>
-      <p:bldGraphic spid="9" grpId="0" uiExpand="1">
-        <p:bldSub>
-          <a:bldChart bld="category"/>
-        </p:bldSub>
-      </p:bldGraphic>
-      <p:bldP spid="6" grpId="0" animBg="1"/>
-      <p:bldP spid="5" grpId="0" animBg="1"/>
-    </p:bldLst>
-  </p:timing>
-</p:sld>
-</file>
-
-<file path=ppt/slides/slide6.xml><?xml version="1.0" encoding="utf-8"?>
-<p:sld xmlns:a="http://schemas.openxmlformats.org/drawingml/2006/main" xmlns:r="http://schemas.openxmlformats.org/officeDocument/2006/relationships" xmlns:p="http://schemas.openxmlformats.org/presentationml/2006/main">
-  <p:cSld>
-    <p:spTree>
-      <p:nvGrpSpPr>
-        <p:cNvPr id="1" name=""/>
-        <p:cNvGrpSpPr/>
-        <p:nvPr/>
-      </p:nvGrpSpPr>
-      <p:grpSpPr>
-        <a:xfrm>
-          <a:off x="0" y="0"/>
-          <a:ext cx="0" cy="0"/>
-          <a:chOff x="0" y="0"/>
-          <a:chExt cx="0" cy="0"/>
-        </a:xfrm>
-      </p:grpSpPr>
-      <p:sp>
-        <p:nvSpPr>
           <p:cNvPr id="4" name="Title 3"/>
           <p:cNvSpPr>
             <a:spLocks noGrp="1"/>
@@ -17050,7 +14730,7 @@
 </p:sld>
 </file>
 
-<file path=ppt/slides/slide7.xml><?xml version="1.0" encoding="utf-8"?>
+<file path=ppt/slides/slide6.xml><?xml version="1.0" encoding="utf-8"?>
 <p:sld xmlns:a="http://schemas.openxmlformats.org/drawingml/2006/main" xmlns:r="http://schemas.openxmlformats.org/officeDocument/2006/relationships" xmlns:p="http://schemas.openxmlformats.org/presentationml/2006/main">
   <p:cSld>
     <p:spTree>
@@ -17293,7 +14973,7 @@
 </p:sld>
 </file>
 
-<file path=ppt/slides/slide8.xml><?xml version="1.0" encoding="utf-8"?>
+<file path=ppt/slides/slide7.xml><?xml version="1.0" encoding="utf-8"?>
 <p:sld xmlns:a="http://schemas.openxmlformats.org/drawingml/2006/main" xmlns:r="http://schemas.openxmlformats.org/officeDocument/2006/relationships" xmlns:p="http://schemas.openxmlformats.org/presentationml/2006/main">
   <p:cSld>
     <p:spTree>
@@ -17693,7 +15373,7 @@
 </p:sld>
 </file>
 
-<file path=ppt/slides/slide9.xml><?xml version="1.0" encoding="utf-8"?>
+<file path=ppt/slides/slide8.xml><?xml version="1.0" encoding="utf-8"?>
 <p:sld xmlns:a="http://schemas.openxmlformats.org/drawingml/2006/main" xmlns:r="http://schemas.openxmlformats.org/officeDocument/2006/relationships" xmlns:p="http://schemas.openxmlformats.org/presentationml/2006/main">
   <p:cSld>
     <p:spTree>
@@ -18511,256 +16191,4 @@
     </a:ext>
   </a:extLst>
 </a:theme>
-</file>
-
-<file path=ppt/theme/themeOverride1.xml><?xml version="1.0" encoding="utf-8"?>
-<a:themeOverride xmlns:a="http://schemas.openxmlformats.org/drawingml/2006/main">
-  <a:clrScheme name="Office">
-    <a:dk1>
-      <a:sysClr val="windowText" lastClr="000000"/>
-    </a:dk1>
-    <a:lt1>
-      <a:sysClr val="window" lastClr="FFFFFF"/>
-    </a:lt1>
-    <a:dk2>
-      <a:srgbClr val="44546A"/>
-    </a:dk2>
-    <a:lt2>
-      <a:srgbClr val="E7E6E6"/>
-    </a:lt2>
-    <a:accent1>
-      <a:srgbClr val="5B9BD5"/>
-    </a:accent1>
-    <a:accent2>
-      <a:srgbClr val="ED7D31"/>
-    </a:accent2>
-    <a:accent3>
-      <a:srgbClr val="A5A5A5"/>
-    </a:accent3>
-    <a:accent4>
-      <a:srgbClr val="FFC000"/>
-    </a:accent4>
-    <a:accent5>
-      <a:srgbClr val="4472C4"/>
-    </a:accent5>
-    <a:accent6>
-      <a:srgbClr val="70AD47"/>
-    </a:accent6>
-    <a:hlink>
-      <a:srgbClr val="0563C1"/>
-    </a:hlink>
-    <a:folHlink>
-      <a:srgbClr val="954F72"/>
-    </a:folHlink>
-  </a:clrScheme>
-  <a:fontScheme name="Office">
-    <a:majorFont>
-      <a:latin typeface="Calibri Light"/>
-      <a:ea typeface=""/>
-      <a:cs typeface=""/>
-      <a:font script="Jpan" typeface="ＭＳ Ｐゴシック"/>
-      <a:font script="Hang" typeface="맑은 고딕"/>
-      <a:font script="Hans" typeface="宋体"/>
-      <a:font script="Hant" typeface="新細明體"/>
-      <a:font script="Arab" typeface="Times New Roman"/>
-      <a:font script="Hebr" typeface="Times New Roman"/>
-      <a:font script="Thai" typeface="Angsana New"/>
-      <a:font script="Ethi" typeface="Nyala"/>
-      <a:font script="Beng" typeface="Vrinda"/>
-      <a:font script="Gujr" typeface="Shruti"/>
-      <a:font script="Khmr" typeface="MoolBoran"/>
-      <a:font script="Knda" typeface="Tunga"/>
-      <a:font script="Guru" typeface="Raavi"/>
-      <a:font script="Cans" typeface="Euphemia"/>
-      <a:font script="Cher" typeface="Plantagenet Cherokee"/>
-      <a:font script="Yiii" typeface="Microsoft Yi Baiti"/>
-      <a:font script="Tibt" typeface="Microsoft Himalaya"/>
-      <a:font script="Thaa" typeface="MV Boli"/>
-      <a:font script="Deva" typeface="Mangal"/>
-      <a:font script="Telu" typeface="Gautami"/>
-      <a:font script="Taml" typeface="Latha"/>
-      <a:font script="Syrc" typeface="Estrangelo Edessa"/>
-      <a:font script="Orya" typeface="Kalinga"/>
-      <a:font script="Mlym" typeface="Kartika"/>
-      <a:font script="Laoo" typeface="DokChampa"/>
-      <a:font script="Sinh" typeface="Iskoola Pota"/>
-      <a:font script="Mong" typeface="Mongolian Baiti"/>
-      <a:font script="Viet" typeface="Times New Roman"/>
-      <a:font script="Uigh" typeface="Microsoft Uighur"/>
-      <a:font script="Geor" typeface="Sylfaen"/>
-    </a:majorFont>
-    <a:minorFont>
-      <a:latin typeface="Calibri"/>
-      <a:ea typeface=""/>
-      <a:cs typeface=""/>
-      <a:font script="Jpan" typeface="ＭＳ Ｐゴシック"/>
-      <a:font script="Hang" typeface="맑은 고딕"/>
-      <a:font script="Hans" typeface="宋体"/>
-      <a:font script="Hant" typeface="新細明體"/>
-      <a:font script="Arab" typeface="Arial"/>
-      <a:font script="Hebr" typeface="Arial"/>
-      <a:font script="Thai" typeface="Cordia New"/>
-      <a:font script="Ethi" typeface="Nyala"/>
-      <a:font script="Beng" typeface="Vrinda"/>
-      <a:font script="Gujr" typeface="Shruti"/>
-      <a:font script="Khmr" typeface="DaunPenh"/>
-      <a:font script="Knda" typeface="Tunga"/>
-      <a:font script="Guru" typeface="Raavi"/>
-      <a:font script="Cans" typeface="Euphemia"/>
-      <a:font script="Cher" typeface="Plantagenet Cherokee"/>
-      <a:font script="Yiii" typeface="Microsoft Yi Baiti"/>
-      <a:font script="Tibt" typeface="Microsoft Himalaya"/>
-      <a:font script="Thaa" typeface="MV Boli"/>
-      <a:font script="Deva" typeface="Mangal"/>
-      <a:font script="Telu" typeface="Gautami"/>
-      <a:font script="Taml" typeface="Latha"/>
-      <a:font script="Syrc" typeface="Estrangelo Edessa"/>
-      <a:font script="Orya" typeface="Kalinga"/>
-      <a:font script="Mlym" typeface="Kartika"/>
-      <a:font script="Laoo" typeface="DokChampa"/>
-      <a:font script="Sinh" typeface="Iskoola Pota"/>
-      <a:font script="Mong" typeface="Mongolian Baiti"/>
-      <a:font script="Viet" typeface="Arial"/>
-      <a:font script="Uigh" typeface="Microsoft Uighur"/>
-      <a:font script="Geor" typeface="Sylfaen"/>
-    </a:minorFont>
-  </a:fontScheme>
-  <a:fmtScheme name="Office">
-    <a:fillStyleLst>
-      <a:solidFill>
-        <a:schemeClr val="phClr"/>
-      </a:solidFill>
-      <a:gradFill rotWithShape="1">
-        <a:gsLst>
-          <a:gs pos="0">
-            <a:schemeClr val="phClr">
-              <a:lumMod val="110000"/>
-              <a:satMod val="105000"/>
-              <a:tint val="67000"/>
-            </a:schemeClr>
-          </a:gs>
-          <a:gs pos="50000">
-            <a:schemeClr val="phClr">
-              <a:lumMod val="105000"/>
-              <a:satMod val="103000"/>
-              <a:tint val="73000"/>
-            </a:schemeClr>
-          </a:gs>
-          <a:gs pos="100000">
-            <a:schemeClr val="phClr">
-              <a:lumMod val="105000"/>
-              <a:satMod val="109000"/>
-              <a:tint val="81000"/>
-            </a:schemeClr>
-          </a:gs>
-        </a:gsLst>
-        <a:lin ang="5400000" scaled="0"/>
-      </a:gradFill>
-      <a:gradFill rotWithShape="1">
-        <a:gsLst>
-          <a:gs pos="0">
-            <a:schemeClr val="phClr">
-              <a:satMod val="103000"/>
-              <a:lumMod val="102000"/>
-              <a:tint val="94000"/>
-            </a:schemeClr>
-          </a:gs>
-          <a:gs pos="50000">
-            <a:schemeClr val="phClr">
-              <a:satMod val="110000"/>
-              <a:lumMod val="100000"/>
-              <a:shade val="100000"/>
-            </a:schemeClr>
-          </a:gs>
-          <a:gs pos="100000">
-            <a:schemeClr val="phClr">
-              <a:lumMod val="99000"/>
-              <a:satMod val="120000"/>
-              <a:shade val="78000"/>
-            </a:schemeClr>
-          </a:gs>
-        </a:gsLst>
-        <a:lin ang="5400000" scaled="0"/>
-      </a:gradFill>
-    </a:fillStyleLst>
-    <a:lnStyleLst>
-      <a:ln w="6350" cap="flat" cmpd="sng" algn="ctr">
-        <a:solidFill>
-          <a:schemeClr val="phClr"/>
-        </a:solidFill>
-        <a:prstDash val="solid"/>
-        <a:miter lim="800000"/>
-      </a:ln>
-      <a:ln w="12700" cap="flat" cmpd="sng" algn="ctr">
-        <a:solidFill>
-          <a:schemeClr val="phClr"/>
-        </a:solidFill>
-        <a:prstDash val="solid"/>
-        <a:miter lim="800000"/>
-      </a:ln>
-      <a:ln w="19050" cap="flat" cmpd="sng" algn="ctr">
-        <a:solidFill>
-          <a:schemeClr val="phClr"/>
-        </a:solidFill>
-        <a:prstDash val="solid"/>
-        <a:miter lim="800000"/>
-      </a:ln>
-    </a:lnStyleLst>
-    <a:effectStyleLst>
-      <a:effectStyle>
-        <a:effectLst/>
-      </a:effectStyle>
-      <a:effectStyle>
-        <a:effectLst/>
-      </a:effectStyle>
-      <a:effectStyle>
-        <a:effectLst>
-          <a:outerShdw blurRad="57150" dist="19050" dir="5400000" algn="ctr" rotWithShape="0">
-            <a:srgbClr val="000000">
-              <a:alpha val="63000"/>
-            </a:srgbClr>
-          </a:outerShdw>
-        </a:effectLst>
-      </a:effectStyle>
-    </a:effectStyleLst>
-    <a:bgFillStyleLst>
-      <a:solidFill>
-        <a:schemeClr val="phClr"/>
-      </a:solidFill>
-      <a:solidFill>
-        <a:schemeClr val="phClr">
-          <a:tint val="95000"/>
-          <a:satMod val="170000"/>
-        </a:schemeClr>
-      </a:solidFill>
-      <a:gradFill rotWithShape="1">
-        <a:gsLst>
-          <a:gs pos="0">
-            <a:schemeClr val="phClr">
-              <a:tint val="93000"/>
-              <a:satMod val="150000"/>
-              <a:shade val="98000"/>
-              <a:lumMod val="102000"/>
-            </a:schemeClr>
-          </a:gs>
-          <a:gs pos="50000">
-            <a:schemeClr val="phClr">
-              <a:tint val="98000"/>
-              <a:satMod val="130000"/>
-              <a:shade val="90000"/>
-              <a:lumMod val="103000"/>
-            </a:schemeClr>
-          </a:gs>
-          <a:gs pos="100000">
-            <a:schemeClr val="phClr">
-              <a:shade val="63000"/>
-              <a:satMod val="120000"/>
-            </a:schemeClr>
-          </a:gs>
-        </a:gsLst>
-        <a:lin ang="5400000" scaled="0"/>
-      </a:gradFill>
-    </a:bgFillStyleLst>
-  </a:fmtScheme>
-</a:themeOverride>
 </file>
</xml_diff>